<commit_message>
Adding a blank slide at the end of 'Data Structures in C.pptx'.
</commit_message>
<xml_diff>
--- a/Data Structures in C.pptx
+++ b/Data Structures in C.pptx
@@ -22,9 +22,10 @@
     <p:sldId id="260" r:id="rId17"/>
     <p:sldId id="261" r:id="rId18"/>
     <p:sldId id="262" r:id="rId19"/>
+    <p:sldId id="263" r:id="rId20"/>
   </p:sldIdLst>
   <p:sldSz cx="9144000" cy="5143500"/>
-  <p:notesSz cx="6858000" cy="9144000"/>
+  <p:notesSz cx="7559675" cy="10691813"/>
 </p:presentation>
 </file>
 
@@ -57,8 +58,8 @@
         </p:nvSpPr>
         <p:spPr>
           <a:xfrm>
-            <a:off x="311760" y="444960"/>
-            <a:ext cx="8520120" cy="572400"/>
+            <a:off x="311760" y="418320"/>
+            <a:ext cx="8519760" cy="625320"/>
           </a:xfrm>
           <a:prstGeom prst="rect">
             <a:avLst/>
@@ -73,10 +74,10 @@
             <a:noAutofit/>
           </a:bodyPr>
           <a:p>
-            <a:pPr indent="0">
+            <a:pPr indent="0" algn="ctr">
               <a:buNone/>
             </a:pPr>
-            <a:endParaRPr b="0" lang="en-US" sz="1400" spc="-1" strike="noStrike">
+            <a:endParaRPr b="0" lang="en-US" sz="4400" spc="-1" strike="noStrike">
               <a:solidFill>
                 <a:srgbClr val="000000"/>
               </a:solidFill>
@@ -98,7 +99,7 @@
         <p:spPr>
           <a:xfrm>
             <a:off x="311760" y="1152360"/>
-            <a:ext cx="8520120" cy="3416040"/>
+            <a:ext cx="8519760" cy="3415680"/>
           </a:xfrm>
           <a:prstGeom prst="rect">
             <a:avLst/>
@@ -139,7 +140,7 @@
         <p:txBody>
           <a:bodyPr/>
           <a:p>
-            <a:fld id="{A4AE3C9A-F098-4A55-A3D1-D4B8540F4178}" type="slidenum">
+            <a:fld id="{0445E51C-5173-4A95-BEE4-0BE28E64C44F}" type="slidenum">
               <a:t>&lt;#&gt;</a:t>
             </a:fld>
           </a:p>
@@ -181,7 +182,7 @@
         <p:txBody>
           <a:bodyPr/>
           <a:p>
-            <a:fld id="{11E3C84B-7894-4480-8CE7-1FA02378B023}" type="slidenum">
+            <a:fld id="{BB11302A-397A-4BFF-8562-59803063C314}" type="slidenum">
               <a:t>&lt;#&gt;</a:t>
             </a:fld>
           </a:p>
@@ -223,7 +224,7 @@
         <p:txBody>
           <a:bodyPr/>
           <a:p>
-            <a:fld id="{616FF57D-402E-491C-9AF4-E4FE6B05CDCD}" type="slidenum">
+            <a:fld id="{C368ED12-BD94-4287-9289-50A130238E31}" type="slidenum">
               <a:t>&lt;#&gt;</a:t>
             </a:fld>
           </a:p>
@@ -265,7 +266,7 @@
         <p:txBody>
           <a:bodyPr/>
           <a:p>
-            <a:fld id="{A256DDDF-9DF4-4160-8DBD-5B3C6C31C154}" type="slidenum">
+            <a:fld id="{9BBB8C50-4A19-490F-9870-FE3F8AB14678}" type="slidenum">
               <a:t>&lt;#&gt;</a:t>
             </a:fld>
           </a:p>
@@ -307,7 +308,7 @@
         <p:txBody>
           <a:bodyPr/>
           <a:p>
-            <a:fld id="{EEAC64CD-524A-4C25-8753-95A7EA9D2E33}" type="slidenum">
+            <a:fld id="{6D4629E9-4BFD-442B-9C6D-DBCD7980E415}" type="slidenum">
               <a:t>&lt;#&gt;</a:t>
             </a:fld>
           </a:p>
@@ -349,7 +350,7 @@
         <p:txBody>
           <a:bodyPr/>
           <a:p>
-            <a:fld id="{FF199B11-EE20-4D97-9222-81B9E19F228A}" type="slidenum">
+            <a:fld id="{F45EA406-9F76-48F0-A3B4-2B6C5F0672BC}" type="slidenum">
               <a:t>&lt;#&gt;</a:t>
             </a:fld>
           </a:p>
@@ -379,7 +380,7 @@
       </p:grpSpPr>
       <p:sp>
         <p:nvSpPr>
-          <p:cNvPr id="14" name="PlaceHolder 1"/>
+          <p:cNvPr id="11" name="PlaceHolder 1"/>
           <p:cNvSpPr>
             <a:spLocks noGrp="1"/>
           </p:cNvSpPr>
@@ -389,8 +390,8 @@
         </p:nvSpPr>
         <p:spPr>
           <a:xfrm>
-            <a:off x="311760" y="444960"/>
-            <a:ext cx="8520120" cy="572400"/>
+            <a:off x="311760" y="418320"/>
+            <a:ext cx="8519760" cy="625320"/>
           </a:xfrm>
           <a:prstGeom prst="rect">
             <a:avLst/>
@@ -405,10 +406,10 @@
             <a:noAutofit/>
           </a:bodyPr>
           <a:p>
-            <a:pPr indent="0">
+            <a:pPr indent="0" algn="ctr">
               <a:buNone/>
             </a:pPr>
-            <a:endParaRPr b="0" lang="en-US" sz="1400" spc="-1" strike="noStrike">
+            <a:endParaRPr b="0" lang="en-US" sz="4400" spc="-1" strike="noStrike">
               <a:solidFill>
                 <a:srgbClr val="000000"/>
               </a:solidFill>
@@ -419,7 +420,7 @@
       </p:sp>
       <p:sp>
         <p:nvSpPr>
-          <p:cNvPr id="15" name="PlaceHolder 2"/>
+          <p:cNvPr id="12" name="PlaceHolder 2"/>
           <p:cNvSpPr>
             <a:spLocks noGrp="1"/>
           </p:cNvSpPr>
@@ -430,7 +431,7 @@
         <p:spPr>
           <a:xfrm>
             <a:off x="311760" y="1152360"/>
-            <a:ext cx="8520120" cy="3416040"/>
+            <a:ext cx="8519760" cy="3415680"/>
           </a:xfrm>
           <a:prstGeom prst="rect">
             <a:avLst/>
@@ -451,7 +452,7 @@
               </a:spcBef>
               <a:buNone/>
             </a:pPr>
-            <a:endParaRPr b="0" lang="en-US" sz="1400" spc="-1" strike="noStrike">
+            <a:endParaRPr b="0" lang="en-US" sz="3200" spc="-1" strike="noStrike">
               <a:solidFill>
                 <a:srgbClr val="000000"/>
               </a:solidFill>
@@ -474,7 +475,7 @@
         <p:txBody>
           <a:bodyPr/>
           <a:p>
-            <a:fld id="{26B81C6D-D01F-45DE-A008-E7E672DCB165}" type="slidenum">
+            <a:fld id="{2FB2C6AC-D5D7-4B52-9C17-E996ACAE41AD}" type="slidenum">
               <a:t>&lt;#&gt;</a:t>
             </a:fld>
           </a:p>
@@ -504,7 +505,7 @@
       </p:grpSpPr>
       <p:sp>
         <p:nvSpPr>
-          <p:cNvPr id="20" name="PlaceHolder 1"/>
+          <p:cNvPr id="17" name="PlaceHolder 1"/>
           <p:cNvSpPr>
             <a:spLocks noGrp="1"/>
           </p:cNvSpPr>
@@ -514,8 +515,8 @@
         </p:nvSpPr>
         <p:spPr>
           <a:xfrm>
-            <a:off x="311760" y="444960"/>
-            <a:ext cx="8520120" cy="572400"/>
+            <a:off x="311760" y="418320"/>
+            <a:ext cx="8519760" cy="625320"/>
           </a:xfrm>
           <a:prstGeom prst="rect">
             <a:avLst/>
@@ -530,10 +531,10 @@
             <a:noAutofit/>
           </a:bodyPr>
           <a:p>
-            <a:pPr indent="0">
+            <a:pPr indent="0" algn="ctr">
               <a:buNone/>
             </a:pPr>
-            <a:endParaRPr b="0" lang="en-US" sz="1400" spc="-1" strike="noStrike">
+            <a:endParaRPr b="0" lang="en-US" sz="4400" spc="-1" strike="noStrike">
               <a:solidFill>
                 <a:srgbClr val="000000"/>
               </a:solidFill>
@@ -544,7 +545,7 @@
       </p:sp>
       <p:sp>
         <p:nvSpPr>
-          <p:cNvPr id="21" name="PlaceHolder 2"/>
+          <p:cNvPr id="18" name="PlaceHolder 2"/>
           <p:cNvSpPr>
             <a:spLocks noGrp="1"/>
           </p:cNvSpPr>
@@ -555,7 +556,7 @@
         <p:spPr>
           <a:xfrm>
             <a:off x="311760" y="1152360"/>
-            <a:ext cx="4157640" cy="3416040"/>
+            <a:ext cx="4157280" cy="3415680"/>
           </a:xfrm>
           <a:prstGeom prst="rect">
             <a:avLst/>
@@ -576,7 +577,7 @@
               </a:spcBef>
               <a:buNone/>
             </a:pPr>
-            <a:endParaRPr b="0" lang="en-US" sz="1400" spc="-1" strike="noStrike">
+            <a:endParaRPr b="0" lang="en-US" sz="3200" spc="-1" strike="noStrike">
               <a:solidFill>
                 <a:srgbClr val="000000"/>
               </a:solidFill>
@@ -587,7 +588,7 @@
       </p:sp>
       <p:sp>
         <p:nvSpPr>
-          <p:cNvPr id="22" name="PlaceHolder 3"/>
+          <p:cNvPr id="19" name="PlaceHolder 3"/>
           <p:cNvSpPr>
             <a:spLocks noGrp="1"/>
           </p:cNvSpPr>
@@ -597,8 +598,8 @@
         </p:nvSpPr>
         <p:spPr>
           <a:xfrm>
-            <a:off x="4677840" y="1152360"/>
-            <a:ext cx="4157640" cy="3416040"/>
+            <a:off x="4677120" y="1152360"/>
+            <a:ext cx="4157280" cy="3415680"/>
           </a:xfrm>
           <a:prstGeom prst="rect">
             <a:avLst/>
@@ -619,7 +620,7 @@
               </a:spcBef>
               <a:buNone/>
             </a:pPr>
-            <a:endParaRPr b="0" lang="en-US" sz="1400" spc="-1" strike="noStrike">
+            <a:endParaRPr b="0" lang="en-US" sz="3200" spc="-1" strike="noStrike">
               <a:solidFill>
                 <a:srgbClr val="000000"/>
               </a:solidFill>
@@ -642,7 +643,7 @@
         <p:txBody>
           <a:bodyPr/>
           <a:p>
-            <a:fld id="{EC16F873-C5EF-49AD-A77A-F9E14B739F46}" type="slidenum">
+            <a:fld id="{6652ED02-DF0D-4332-AFAF-5DA4008B037E}" type="slidenum">
               <a:t>&lt;#&gt;</a:t>
             </a:fld>
           </a:p>
@@ -672,7 +673,7 @@
       </p:grpSpPr>
       <p:sp>
         <p:nvSpPr>
-          <p:cNvPr id="25" name="PlaceHolder 1"/>
+          <p:cNvPr id="22" name="PlaceHolder 1"/>
           <p:cNvSpPr>
             <a:spLocks noGrp="1"/>
           </p:cNvSpPr>
@@ -682,8 +683,8 @@
         </p:nvSpPr>
         <p:spPr>
           <a:xfrm>
-            <a:off x="311760" y="444960"/>
-            <a:ext cx="8520120" cy="572400"/>
+            <a:off x="311760" y="418320"/>
+            <a:ext cx="8519760" cy="625320"/>
           </a:xfrm>
           <a:prstGeom prst="rect">
             <a:avLst/>
@@ -698,10 +699,10 @@
             <a:noAutofit/>
           </a:bodyPr>
           <a:p>
-            <a:pPr indent="0">
+            <a:pPr indent="0" algn="ctr">
               <a:buNone/>
             </a:pPr>
-            <a:endParaRPr b="0" lang="en-US" sz="1400" spc="-1" strike="noStrike">
+            <a:endParaRPr b="0" lang="en-US" sz="4400" spc="-1" strike="noStrike">
               <a:solidFill>
                 <a:srgbClr val="000000"/>
               </a:solidFill>
@@ -724,7 +725,7 @@
         <p:txBody>
           <a:bodyPr/>
           <a:p>
-            <a:fld id="{D327841B-F688-46BC-A0C7-B22D1FFB384C}" type="slidenum">
+            <a:fld id="{0F8100FC-05EE-4620-84DA-9DEB954D11CF}" type="slidenum">
               <a:t>&lt;#&gt;</a:t>
             </a:fld>
           </a:p>
@@ -766,7 +767,7 @@
         <p:txBody>
           <a:bodyPr/>
           <a:p>
-            <a:fld id="{27D59492-597B-4880-97F6-57073F6DCB2F}" type="slidenum">
+            <a:fld id="{0C244B6A-F605-4421-8B3B-6356547F1FEB}" type="slidenum">
               <a:t>&lt;#&gt;</a:t>
             </a:fld>
           </a:p>
@@ -808,7 +809,7 @@
         <p:txBody>
           <a:bodyPr/>
           <a:p>
-            <a:fld id="{7202D015-1BAE-4D25-BD36-D4E80B8F332C}" type="slidenum">
+            <a:fld id="{9B373EE9-CCC3-4368-A778-46F2E6B3F919}" type="slidenum">
               <a:t>&lt;#&gt;</a:t>
             </a:fld>
           </a:p>
@@ -855,8 +856,8 @@
         </p:nvSpPr>
         <p:spPr>
           <a:xfrm>
-            <a:off x="311760" y="744480"/>
-            <a:ext cx="8520120" cy="2052360"/>
+            <a:off x="311760" y="444960"/>
+            <a:ext cx="8519760" cy="572040"/>
           </a:xfrm>
           <a:prstGeom prst="rect">
             <a:avLst/>
@@ -867,15 +868,15 @@
           </a:ln>
         </p:spPr>
         <p:txBody>
-          <a:bodyPr lIns="91440" rIns="91440" tIns="91440" bIns="91440" anchor="b">
-            <a:normAutofit/>
+          <a:bodyPr lIns="0" rIns="0" tIns="0" bIns="0" anchor="ctr">
+            <a:noAutofit/>
           </a:bodyPr>
           <a:p>
             <a:pPr indent="0">
               <a:buNone/>
             </a:pPr>
             <a:r>
-              <a:rPr b="0" lang="en-US" sz="5200" spc="-1" strike="noStrike">
+              <a:rPr b="0" lang="en-US" sz="1800" spc="-1" strike="noStrike">
                 <a:solidFill>
                   <a:srgbClr val="000000"/>
                 </a:solidFill>
@@ -883,7 +884,7 @@
               </a:rPr>
               <a:t>Click to edit the title text format</a:t>
             </a:r>
-            <a:endParaRPr b="0" lang="en-US" sz="5200" spc="-1" strike="noStrike">
+            <a:endParaRPr b="0" lang="en-US" sz="1800" spc="-1" strike="noStrike">
               <a:solidFill>
                 <a:srgbClr val="000000"/>
               </a:solidFill>
@@ -905,7 +906,7 @@
         <p:spPr>
           <a:xfrm>
             <a:off x="8472600" y="4663080"/>
-            <a:ext cx="548280" cy="393120"/>
+            <a:ext cx="547920" cy="392760"/>
           </a:xfrm>
           <a:prstGeom prst="rect">
             <a:avLst/>
@@ -917,7 +918,7 @@
         </p:spPr>
         <p:txBody>
           <a:bodyPr lIns="91440" rIns="91440" tIns="91440" bIns="91440" anchor="ctr">
-            <a:normAutofit/>
+            <a:noAutofit/>
           </a:bodyPr>
           <a:lstStyle>
             <a:lvl1pPr indent="0" algn="r">
@@ -947,7 +948,7 @@
                 <a:tab algn="l" pos="0"/>
               </a:tabLst>
             </a:pPr>
-            <a:fld id="{EDF3F7D0-E291-4BFD-9DC5-6A0028E8F076}" type="slidenum">
+            <a:fld id="{3C8BA34B-B339-4F15-AB02-E1376E2D11EF}" type="slidenum">
               <a:rPr b="0" lang="en" sz="1000" spc="-1" strike="noStrike">
                 <a:solidFill>
                   <a:schemeClr val="dk2"/>
@@ -955,7 +956,7 @@
                 <a:latin typeface="Arial"/>
                 <a:ea typeface="Arial"/>
               </a:rPr>
-              <a:t>&lt;number&gt;</a:t>
+              <a:t>8</a:t>
             </a:fld>
             <a:endParaRPr b="0" lang="en-US" sz="1000" spc="-1" strike="noStrike">
               <a:solidFill>
@@ -1006,7 +1007,7 @@
               <a:buChar char=""/>
             </a:pPr>
             <a:r>
-              <a:rPr b="0" lang="en-US" sz="1400" spc="-1" strike="noStrike">
+              <a:rPr b="0" lang="en-US" sz="3200" spc="-1" strike="noStrike">
                 <a:solidFill>
                   <a:srgbClr val="000000"/>
                 </a:solidFill>
@@ -1014,7 +1015,7 @@
               </a:rPr>
               <a:t>Click to edit the outline text format</a:t>
             </a:r>
-            <a:endParaRPr b="0" lang="en-US" sz="1400" spc="-1" strike="noStrike">
+            <a:endParaRPr b="0" lang="en-US" sz="3200" spc="-1" strike="noStrike">
               <a:solidFill>
                 <a:srgbClr val="000000"/>
               </a:solidFill>
@@ -1034,7 +1035,7 @@
               <a:buChar char=""/>
             </a:pPr>
             <a:r>
-              <a:rPr b="0" lang="en-US" sz="1400" spc="-1" strike="noStrike">
+              <a:rPr b="0" lang="en-US" sz="2800" spc="-1" strike="noStrike">
                 <a:solidFill>
                   <a:srgbClr val="000000"/>
                 </a:solidFill>
@@ -1042,7 +1043,7 @@
               </a:rPr>
               <a:t>Second Outline Level</a:t>
             </a:r>
-            <a:endParaRPr b="0" lang="en-US" sz="1400" spc="-1" strike="noStrike">
+            <a:endParaRPr b="0" lang="en-US" sz="2800" spc="-1" strike="noStrike">
               <a:solidFill>
                 <a:srgbClr val="000000"/>
               </a:solidFill>
@@ -1062,7 +1063,7 @@
               <a:buChar char=""/>
             </a:pPr>
             <a:r>
-              <a:rPr b="0" lang="en-US" sz="1400" spc="-1" strike="noStrike">
+              <a:rPr b="0" lang="en-US" sz="2400" spc="-1" strike="noStrike">
                 <a:solidFill>
                   <a:srgbClr val="000000"/>
                 </a:solidFill>
@@ -1070,7 +1071,7 @@
               </a:rPr>
               <a:t>Third Outline Level</a:t>
             </a:r>
-            <a:endParaRPr b="0" lang="en-US" sz="1400" spc="-1" strike="noStrike">
+            <a:endParaRPr b="0" lang="en-US" sz="2400" spc="-1" strike="noStrike">
               <a:solidFill>
                 <a:srgbClr val="000000"/>
               </a:solidFill>
@@ -1090,7 +1091,7 @@
               <a:buChar char=""/>
             </a:pPr>
             <a:r>
-              <a:rPr b="0" lang="en-US" sz="1400" spc="-1" strike="noStrike">
+              <a:rPr b="0" lang="en-US" sz="2000" spc="-1" strike="noStrike">
                 <a:solidFill>
                   <a:srgbClr val="000000"/>
                 </a:solidFill>
@@ -1098,7 +1099,7 @@
               </a:rPr>
               <a:t>Fourth Outline Level</a:t>
             </a:r>
-            <a:endParaRPr b="0" lang="en-US" sz="1400" spc="-1" strike="noStrike">
+            <a:endParaRPr b="0" lang="en-US" sz="2000" spc="-1" strike="noStrike">
               <a:solidFill>
                 <a:srgbClr val="000000"/>
               </a:solidFill>
@@ -1226,14 +1227,14 @@
       </p:grpSpPr>
       <p:sp>
         <p:nvSpPr>
-          <p:cNvPr id="31" name="Google Shape;36;p9"/>
+          <p:cNvPr id="25" name="Google Shape;36;p9"/>
           <p:cNvSpPr/>
           <p:nvPr/>
         </p:nvSpPr>
         <p:spPr>
           <a:xfrm>
             <a:off x="4572000" y="0"/>
-            <a:ext cx="4571640" cy="5143320"/>
+            <a:ext cx="4571280" cy="5142960"/>
           </a:xfrm>
           <a:prstGeom prst="rect">
             <a:avLst/>
@@ -1252,7 +1253,7 @@
           <a:fontRef idx="minor"/>
         </p:style>
         <p:txBody>
-          <a:bodyPr tIns="91440" bIns="91440" anchor="ctr">
+          <a:bodyPr lIns="90000" rIns="90000" tIns="91440" bIns="91440" anchor="ctr">
             <a:noAutofit/>
           </a:bodyPr>
           <a:p>
@@ -1275,67 +1276,18 @@
       </p:sp>
       <p:sp>
         <p:nvSpPr>
-          <p:cNvPr id="32" name="PlaceHolder 1"/>
+          <p:cNvPr id="26" name="PlaceHolder 1"/>
           <p:cNvSpPr>
             <a:spLocks noGrp="1"/>
           </p:cNvSpPr>
           <p:nvPr>
-            <p:ph type="title"/>
+            <p:ph type="sldNum" idx="10"/>
           </p:nvPr>
         </p:nvSpPr>
         <p:spPr>
           <a:xfrm>
-            <a:off x="265680" y="1233000"/>
-            <a:ext cx="4044960" cy="1482120"/>
-          </a:xfrm>
-          <a:prstGeom prst="rect">
-            <a:avLst/>
-          </a:prstGeom>
-          <a:noFill/>
-          <a:ln w="0">
-            <a:noFill/>
-          </a:ln>
-        </p:spPr>
-        <p:txBody>
-          <a:bodyPr lIns="91440" rIns="91440" tIns="91440" bIns="91440" anchor="b">
-            <a:normAutofit/>
-          </a:bodyPr>
-          <a:p>
-            <a:pPr indent="0">
-              <a:buNone/>
-            </a:pPr>
-            <a:r>
-              <a:rPr b="0" lang="en-US" sz="4200" spc="-1" strike="noStrike">
-                <a:solidFill>
-                  <a:srgbClr val="000000"/>
-                </a:solidFill>
-                <a:latin typeface="Arial"/>
-              </a:rPr>
-              <a:t>Click to edit the title text format</a:t>
-            </a:r>
-            <a:endParaRPr b="0" lang="en-US" sz="4200" spc="-1" strike="noStrike">
-              <a:solidFill>
-                <a:srgbClr val="000000"/>
-              </a:solidFill>
-              <a:latin typeface="Arial"/>
-            </a:endParaRPr>
-          </a:p>
-        </p:txBody>
-      </p:sp>
-      <p:sp>
-        <p:nvSpPr>
-          <p:cNvPr id="33" name="PlaceHolder 2"/>
-          <p:cNvSpPr>
-            <a:spLocks noGrp="1"/>
-          </p:cNvSpPr>
-          <p:nvPr>
-            <p:ph type="body"/>
-          </p:nvPr>
-        </p:nvSpPr>
-        <p:spPr>
-          <a:xfrm>
-            <a:off x="4939560" y="723960"/>
-            <a:ext cx="3836520" cy="3694680"/>
+            <a:off x="8472600" y="4663080"/>
+            <a:ext cx="547920" cy="392760"/>
           </a:xfrm>
           <a:prstGeom prst="rect">
             <a:avLst/>
@@ -1347,232 +1299,7 @@
         </p:spPr>
         <p:txBody>
           <a:bodyPr lIns="91440" rIns="91440" tIns="91440" bIns="91440" anchor="ctr">
-            <a:normAutofit fontScale="87222" lnSpcReduction="10000"/>
-          </a:bodyPr>
-          <a:p>
-            <a:pPr marL="432000" indent="-324000">
-              <a:spcBef>
-                <a:spcPts val="1417"/>
-              </a:spcBef>
-              <a:buClr>
-                <a:srgbClr val="000000"/>
-              </a:buClr>
-              <a:buSzPct val="45000"/>
-              <a:buFont typeface="Wingdings" charset="2"/>
-              <a:buChar char=""/>
-            </a:pPr>
-            <a:r>
-              <a:rPr b="0" lang="en-US" sz="1800" spc="-1" strike="noStrike">
-                <a:solidFill>
-                  <a:srgbClr val="000000"/>
-                </a:solidFill>
-                <a:latin typeface="Arial"/>
-              </a:rPr>
-              <a:t>Click to edit the outline text format</a:t>
-            </a:r>
-            <a:endParaRPr b="0" lang="en-US" sz="1800" spc="-1" strike="noStrike">
-              <a:solidFill>
-                <a:srgbClr val="000000"/>
-              </a:solidFill>
-              <a:latin typeface="Arial"/>
-            </a:endParaRPr>
-          </a:p>
-          <a:p>
-            <a:pPr lvl="1" marL="864000" indent="-324000">
-              <a:spcBef>
-                <a:spcPts val="1134"/>
-              </a:spcBef>
-              <a:buClr>
-                <a:srgbClr val="000000"/>
-              </a:buClr>
-              <a:buSzPct val="75000"/>
-              <a:buFont typeface="Symbol" charset="2"/>
-              <a:buChar char=""/>
-            </a:pPr>
-            <a:r>
-              <a:rPr b="0" lang="en-US" sz="1800" spc="-1" strike="noStrike">
-                <a:solidFill>
-                  <a:srgbClr val="000000"/>
-                </a:solidFill>
-                <a:latin typeface="Arial"/>
-              </a:rPr>
-              <a:t>Second Outline Level</a:t>
-            </a:r>
-            <a:endParaRPr b="0" lang="en-US" sz="1800" spc="-1" strike="noStrike">
-              <a:solidFill>
-                <a:srgbClr val="000000"/>
-              </a:solidFill>
-              <a:latin typeface="Arial"/>
-            </a:endParaRPr>
-          </a:p>
-          <a:p>
-            <a:pPr lvl="2" marL="1296000" indent="-288000">
-              <a:spcBef>
-                <a:spcPts val="850"/>
-              </a:spcBef>
-              <a:buClr>
-                <a:srgbClr val="000000"/>
-              </a:buClr>
-              <a:buSzPct val="45000"/>
-              <a:buFont typeface="Wingdings" charset="2"/>
-              <a:buChar char=""/>
-            </a:pPr>
-            <a:r>
-              <a:rPr b="0" lang="en-US" sz="1800" spc="-1" strike="noStrike">
-                <a:solidFill>
-                  <a:srgbClr val="000000"/>
-                </a:solidFill>
-                <a:latin typeface="Arial"/>
-              </a:rPr>
-              <a:t>Third Outline Level</a:t>
-            </a:r>
-            <a:endParaRPr b="0" lang="en-US" sz="1800" spc="-1" strike="noStrike">
-              <a:solidFill>
-                <a:srgbClr val="000000"/>
-              </a:solidFill>
-              <a:latin typeface="Arial"/>
-            </a:endParaRPr>
-          </a:p>
-          <a:p>
-            <a:pPr lvl="3" marL="1728000" indent="-216000">
-              <a:spcBef>
-                <a:spcPts val="567"/>
-              </a:spcBef>
-              <a:buClr>
-                <a:srgbClr val="000000"/>
-              </a:buClr>
-              <a:buSzPct val="75000"/>
-              <a:buFont typeface="Symbol" charset="2"/>
-              <a:buChar char=""/>
-            </a:pPr>
-            <a:r>
-              <a:rPr b="0" lang="en-US" sz="1800" spc="-1" strike="noStrike">
-                <a:solidFill>
-                  <a:srgbClr val="000000"/>
-                </a:solidFill>
-                <a:latin typeface="Arial"/>
-              </a:rPr>
-              <a:t>Fourth Outline Level</a:t>
-            </a:r>
-            <a:endParaRPr b="0" lang="en-US" sz="1800" spc="-1" strike="noStrike">
-              <a:solidFill>
-                <a:srgbClr val="000000"/>
-              </a:solidFill>
-              <a:latin typeface="Arial"/>
-            </a:endParaRPr>
-          </a:p>
-          <a:p>
-            <a:pPr lvl="4" marL="2160000" indent="-216000">
-              <a:spcBef>
-                <a:spcPts val="283"/>
-              </a:spcBef>
-              <a:buClr>
-                <a:srgbClr val="000000"/>
-              </a:buClr>
-              <a:buSzPct val="45000"/>
-              <a:buFont typeface="Wingdings" charset="2"/>
-              <a:buChar char=""/>
-            </a:pPr>
-            <a:r>
-              <a:rPr b="0" lang="en-US" sz="1800" spc="-1" strike="noStrike">
-                <a:solidFill>
-                  <a:srgbClr val="000000"/>
-                </a:solidFill>
-                <a:latin typeface="Arial"/>
-              </a:rPr>
-              <a:t>Fifth Outline Level</a:t>
-            </a:r>
-            <a:endParaRPr b="0" lang="en-US" sz="1800" spc="-1" strike="noStrike">
-              <a:solidFill>
-                <a:srgbClr val="000000"/>
-              </a:solidFill>
-              <a:latin typeface="Arial"/>
-            </a:endParaRPr>
-          </a:p>
-          <a:p>
-            <a:pPr lvl="5" marL="2592000" indent="-216000">
-              <a:spcBef>
-                <a:spcPts val="283"/>
-              </a:spcBef>
-              <a:buClr>
-                <a:srgbClr val="000000"/>
-              </a:buClr>
-              <a:buSzPct val="45000"/>
-              <a:buFont typeface="Wingdings" charset="2"/>
-              <a:buChar char=""/>
-            </a:pPr>
-            <a:r>
-              <a:rPr b="0" lang="en-US" sz="1800" spc="-1" strike="noStrike">
-                <a:solidFill>
-                  <a:srgbClr val="000000"/>
-                </a:solidFill>
-                <a:latin typeface="Arial"/>
-              </a:rPr>
-              <a:t>Sixth Outline Level</a:t>
-            </a:r>
-            <a:endParaRPr b="0" lang="en-US" sz="1800" spc="-1" strike="noStrike">
-              <a:solidFill>
-                <a:srgbClr val="000000"/>
-              </a:solidFill>
-              <a:latin typeface="Arial"/>
-            </a:endParaRPr>
-          </a:p>
-          <a:p>
-            <a:pPr lvl="6" marL="3024000" indent="-216000">
-              <a:spcBef>
-                <a:spcPts val="283"/>
-              </a:spcBef>
-              <a:buClr>
-                <a:srgbClr val="000000"/>
-              </a:buClr>
-              <a:buSzPct val="45000"/>
-              <a:buFont typeface="Wingdings" charset="2"/>
-              <a:buChar char=""/>
-            </a:pPr>
-            <a:r>
-              <a:rPr b="0" lang="en-US" sz="1800" spc="-1" strike="noStrike">
-                <a:solidFill>
-                  <a:srgbClr val="000000"/>
-                </a:solidFill>
-                <a:latin typeface="Arial"/>
-              </a:rPr>
-              <a:t>Seventh Outline Level</a:t>
-            </a:r>
-            <a:endParaRPr b="0" lang="en-US" sz="1800" spc="-1" strike="noStrike">
-              <a:solidFill>
-                <a:srgbClr val="000000"/>
-              </a:solidFill>
-              <a:latin typeface="Arial"/>
-            </a:endParaRPr>
-          </a:p>
-        </p:txBody>
-      </p:sp>
-      <p:sp>
-        <p:nvSpPr>
-          <p:cNvPr id="34" name="PlaceHolder 3"/>
-          <p:cNvSpPr>
-            <a:spLocks noGrp="1"/>
-          </p:cNvSpPr>
-          <p:nvPr>
-            <p:ph type="sldNum" idx="10"/>
-          </p:nvPr>
-        </p:nvSpPr>
-        <p:spPr>
-          <a:xfrm>
-            <a:off x="8472600" y="4663080"/>
-            <a:ext cx="548280" cy="393120"/>
-          </a:xfrm>
-          <a:prstGeom prst="rect">
-            <a:avLst/>
-          </a:prstGeom>
-          <a:noFill/>
-          <a:ln w="0">
-            <a:noFill/>
-          </a:ln>
-        </p:spPr>
-        <p:txBody>
-          <a:bodyPr lIns="91440" rIns="91440" tIns="91440" bIns="91440" anchor="ctr">
-            <a:normAutofit/>
+            <a:noAutofit/>
           </a:bodyPr>
           <a:lstStyle>
             <a:lvl1pPr indent="0" algn="r">
@@ -1602,7 +1329,7 @@
                 <a:tab algn="l" pos="0"/>
               </a:tabLst>
             </a:pPr>
-            <a:fld id="{DD6D402B-E88D-48CA-94A6-D57FD7AD3047}" type="slidenum">
+            <a:fld id="{4CE90EB9-A76B-4E75-995B-B5F988ED3444}" type="slidenum">
               <a:rPr b="0" lang="en" sz="1000" spc="-1" strike="noStrike">
                 <a:solidFill>
                   <a:schemeClr val="dk2"/>
@@ -1656,18 +1383,18 @@
       </p:grpSpPr>
       <p:sp>
         <p:nvSpPr>
-          <p:cNvPr id="35" name="PlaceHolder 1"/>
+          <p:cNvPr id="27" name="PlaceHolder 1"/>
           <p:cNvSpPr>
             <a:spLocks noGrp="1"/>
           </p:cNvSpPr>
           <p:nvPr>
-            <p:ph type="body"/>
+            <p:ph type="sldNum" idx="11"/>
           </p:nvPr>
         </p:nvSpPr>
         <p:spPr>
           <a:xfrm>
-            <a:off x="311760" y="4230720"/>
-            <a:ext cx="5998320" cy="604800"/>
+            <a:off x="8472600" y="4663080"/>
+            <a:ext cx="547920" cy="392760"/>
           </a:xfrm>
           <a:prstGeom prst="rect">
             <a:avLst/>
@@ -1679,232 +1406,7 @@
         </p:spPr>
         <p:txBody>
           <a:bodyPr lIns="91440" rIns="91440" tIns="91440" bIns="91440" anchor="ctr">
-            <a:normAutofit fontScale="1111"/>
-          </a:bodyPr>
-          <a:p>
-            <a:pPr marL="432000" indent="-324000">
-              <a:spcBef>
-                <a:spcPts val="1417"/>
-              </a:spcBef>
-              <a:buClr>
-                <a:srgbClr val="000000"/>
-              </a:buClr>
-              <a:buSzPct val="45000"/>
-              <a:buFont typeface="Wingdings" charset="2"/>
-              <a:buChar char=""/>
-            </a:pPr>
-            <a:r>
-              <a:rPr b="0" lang="en-US" sz="1800" spc="-1" strike="noStrike">
-                <a:solidFill>
-                  <a:srgbClr val="000000"/>
-                </a:solidFill>
-                <a:latin typeface="Arial"/>
-              </a:rPr>
-              <a:t>Click to edit the outline text format</a:t>
-            </a:r>
-            <a:endParaRPr b="0" lang="en-US" sz="1800" spc="-1" strike="noStrike">
-              <a:solidFill>
-                <a:srgbClr val="000000"/>
-              </a:solidFill>
-              <a:latin typeface="Arial"/>
-            </a:endParaRPr>
-          </a:p>
-          <a:p>
-            <a:pPr lvl="1" marL="864000" indent="-324000">
-              <a:spcBef>
-                <a:spcPts val="1134"/>
-              </a:spcBef>
-              <a:buClr>
-                <a:srgbClr val="000000"/>
-              </a:buClr>
-              <a:buSzPct val="75000"/>
-              <a:buFont typeface="Symbol" charset="2"/>
-              <a:buChar char=""/>
-            </a:pPr>
-            <a:r>
-              <a:rPr b="0" lang="en-US" sz="1800" spc="-1" strike="noStrike">
-                <a:solidFill>
-                  <a:srgbClr val="000000"/>
-                </a:solidFill>
-                <a:latin typeface="Arial"/>
-              </a:rPr>
-              <a:t>Second Outline Level</a:t>
-            </a:r>
-            <a:endParaRPr b="0" lang="en-US" sz="1800" spc="-1" strike="noStrike">
-              <a:solidFill>
-                <a:srgbClr val="000000"/>
-              </a:solidFill>
-              <a:latin typeface="Arial"/>
-            </a:endParaRPr>
-          </a:p>
-          <a:p>
-            <a:pPr lvl="2" marL="1296000" indent="-288000">
-              <a:spcBef>
-                <a:spcPts val="850"/>
-              </a:spcBef>
-              <a:buClr>
-                <a:srgbClr val="000000"/>
-              </a:buClr>
-              <a:buSzPct val="45000"/>
-              <a:buFont typeface="Wingdings" charset="2"/>
-              <a:buChar char=""/>
-            </a:pPr>
-            <a:r>
-              <a:rPr b="0" lang="en-US" sz="1800" spc="-1" strike="noStrike">
-                <a:solidFill>
-                  <a:srgbClr val="000000"/>
-                </a:solidFill>
-                <a:latin typeface="Arial"/>
-              </a:rPr>
-              <a:t>Third Outline Level</a:t>
-            </a:r>
-            <a:endParaRPr b="0" lang="en-US" sz="1800" spc="-1" strike="noStrike">
-              <a:solidFill>
-                <a:srgbClr val="000000"/>
-              </a:solidFill>
-              <a:latin typeface="Arial"/>
-            </a:endParaRPr>
-          </a:p>
-          <a:p>
-            <a:pPr lvl="3" marL="1728000" indent="-216000">
-              <a:spcBef>
-                <a:spcPts val="567"/>
-              </a:spcBef>
-              <a:buClr>
-                <a:srgbClr val="000000"/>
-              </a:buClr>
-              <a:buSzPct val="75000"/>
-              <a:buFont typeface="Symbol" charset="2"/>
-              <a:buChar char=""/>
-            </a:pPr>
-            <a:r>
-              <a:rPr b="0" lang="en-US" sz="1800" spc="-1" strike="noStrike">
-                <a:solidFill>
-                  <a:srgbClr val="000000"/>
-                </a:solidFill>
-                <a:latin typeface="Arial"/>
-              </a:rPr>
-              <a:t>Fourth Outline Level</a:t>
-            </a:r>
-            <a:endParaRPr b="0" lang="en-US" sz="1800" spc="-1" strike="noStrike">
-              <a:solidFill>
-                <a:srgbClr val="000000"/>
-              </a:solidFill>
-              <a:latin typeface="Arial"/>
-            </a:endParaRPr>
-          </a:p>
-          <a:p>
-            <a:pPr lvl="4" marL="2160000" indent="-216000">
-              <a:spcBef>
-                <a:spcPts val="283"/>
-              </a:spcBef>
-              <a:buClr>
-                <a:srgbClr val="000000"/>
-              </a:buClr>
-              <a:buSzPct val="45000"/>
-              <a:buFont typeface="Wingdings" charset="2"/>
-              <a:buChar char=""/>
-            </a:pPr>
-            <a:r>
-              <a:rPr b="0" lang="en-US" sz="1800" spc="-1" strike="noStrike">
-                <a:solidFill>
-                  <a:srgbClr val="000000"/>
-                </a:solidFill>
-                <a:latin typeface="Arial"/>
-              </a:rPr>
-              <a:t>Fifth Outline Level</a:t>
-            </a:r>
-            <a:endParaRPr b="0" lang="en-US" sz="1800" spc="-1" strike="noStrike">
-              <a:solidFill>
-                <a:srgbClr val="000000"/>
-              </a:solidFill>
-              <a:latin typeface="Arial"/>
-            </a:endParaRPr>
-          </a:p>
-          <a:p>
-            <a:pPr lvl="5" marL="2592000" indent="-216000">
-              <a:spcBef>
-                <a:spcPts val="283"/>
-              </a:spcBef>
-              <a:buClr>
-                <a:srgbClr val="000000"/>
-              </a:buClr>
-              <a:buSzPct val="45000"/>
-              <a:buFont typeface="Wingdings" charset="2"/>
-              <a:buChar char=""/>
-            </a:pPr>
-            <a:r>
-              <a:rPr b="0" lang="en-US" sz="1800" spc="-1" strike="noStrike">
-                <a:solidFill>
-                  <a:srgbClr val="000000"/>
-                </a:solidFill>
-                <a:latin typeface="Arial"/>
-              </a:rPr>
-              <a:t>Sixth Outline Level</a:t>
-            </a:r>
-            <a:endParaRPr b="0" lang="en-US" sz="1800" spc="-1" strike="noStrike">
-              <a:solidFill>
-                <a:srgbClr val="000000"/>
-              </a:solidFill>
-              <a:latin typeface="Arial"/>
-            </a:endParaRPr>
-          </a:p>
-          <a:p>
-            <a:pPr lvl="6" marL="3024000" indent="-216000">
-              <a:spcBef>
-                <a:spcPts val="283"/>
-              </a:spcBef>
-              <a:buClr>
-                <a:srgbClr val="000000"/>
-              </a:buClr>
-              <a:buSzPct val="45000"/>
-              <a:buFont typeface="Wingdings" charset="2"/>
-              <a:buChar char=""/>
-            </a:pPr>
-            <a:r>
-              <a:rPr b="0" lang="en-US" sz="1800" spc="-1" strike="noStrike">
-                <a:solidFill>
-                  <a:srgbClr val="000000"/>
-                </a:solidFill>
-                <a:latin typeface="Arial"/>
-              </a:rPr>
-              <a:t>Seventh Outline Level</a:t>
-            </a:r>
-            <a:endParaRPr b="0" lang="en-US" sz="1800" spc="-1" strike="noStrike">
-              <a:solidFill>
-                <a:srgbClr val="000000"/>
-              </a:solidFill>
-              <a:latin typeface="Arial"/>
-            </a:endParaRPr>
-          </a:p>
-        </p:txBody>
-      </p:sp>
-      <p:sp>
-        <p:nvSpPr>
-          <p:cNvPr id="36" name="PlaceHolder 2"/>
-          <p:cNvSpPr>
-            <a:spLocks noGrp="1"/>
-          </p:cNvSpPr>
-          <p:nvPr>
-            <p:ph type="sldNum" idx="11"/>
-          </p:nvPr>
-        </p:nvSpPr>
-        <p:spPr>
-          <a:xfrm>
-            <a:off x="8472600" y="4663080"/>
-            <a:ext cx="548280" cy="393120"/>
-          </a:xfrm>
-          <a:prstGeom prst="rect">
-            <a:avLst/>
-          </a:prstGeom>
-          <a:noFill/>
-          <a:ln w="0">
-            <a:noFill/>
-          </a:ln>
-        </p:spPr>
-        <p:txBody>
-          <a:bodyPr lIns="91440" rIns="91440" tIns="91440" bIns="91440" anchor="ctr">
-            <a:normAutofit/>
+            <a:noAutofit/>
           </a:bodyPr>
           <a:lstStyle>
             <a:lvl1pPr indent="0" algn="r">
@@ -1934,7 +1436,7 @@
                 <a:tab algn="l" pos="0"/>
               </a:tabLst>
             </a:pPr>
-            <a:fld id="{D32B0441-7C6D-4C0E-A371-0BB376E56FB8}" type="slidenum">
+            <a:fld id="{B2077329-0304-443A-86C7-DFF9162E6617}" type="slidenum">
               <a:rPr b="0" lang="en" sz="1000" spc="-1" strike="noStrike">
                 <a:solidFill>
                   <a:schemeClr val="dk2"/>
@@ -1993,291 +1495,13 @@
             <a:spLocks noGrp="1"/>
           </p:cNvSpPr>
           <p:nvPr>
-            <p:ph type="title"/>
-          </p:nvPr>
-        </p:nvSpPr>
-        <p:spPr>
-          <a:xfrm>
-            <a:off x="311760" y="1106280"/>
-            <a:ext cx="8520120" cy="1963080"/>
-          </a:xfrm>
-          <a:prstGeom prst="rect">
-            <a:avLst/>
-          </a:prstGeom>
-          <a:noFill/>
-          <a:ln w="0">
-            <a:noFill/>
-          </a:ln>
-        </p:spPr>
-        <p:txBody>
-          <a:bodyPr lIns="91440" rIns="91440" tIns="91440" bIns="91440" anchor="b">
-            <a:normAutofit fontScale="98341"/>
-          </a:bodyPr>
-          <a:p>
-            <a:pPr indent="0" algn="ctr">
-              <a:lnSpc>
-                <a:spcPct val="100000"/>
-              </a:lnSpc>
-              <a:buNone/>
-            </a:pPr>
-            <a:r>
-              <a:rPr b="0" lang="en-US" sz="12000" spc="-1" strike="noStrike">
-                <a:solidFill>
-                  <a:schemeClr val="dk1"/>
-                </a:solidFill>
-                <a:latin typeface="Arial"/>
-                <a:ea typeface="Arial"/>
-              </a:rPr>
-              <a:t>xx%</a:t>
-            </a:r>
-            <a:endParaRPr b="0" lang="en-US" sz="12000" spc="-1" strike="noStrike">
-              <a:solidFill>
-                <a:srgbClr val="000000"/>
-              </a:solidFill>
-              <a:latin typeface="Arial"/>
-            </a:endParaRPr>
-          </a:p>
-        </p:txBody>
-      </p:sp>
-      <p:sp>
-        <p:nvSpPr>
-          <p:cNvPr id="6" name="PlaceHolder 2"/>
-          <p:cNvSpPr>
-            <a:spLocks noGrp="1"/>
-          </p:cNvSpPr>
-          <p:nvPr>
-            <p:ph type="body"/>
-          </p:nvPr>
-        </p:nvSpPr>
-        <p:spPr>
-          <a:xfrm>
-            <a:off x="311760" y="3152160"/>
-            <a:ext cx="8520120" cy="1300320"/>
-          </a:xfrm>
-          <a:prstGeom prst="rect">
-            <a:avLst/>
-          </a:prstGeom>
-          <a:noFill/>
-          <a:ln w="0">
-            <a:noFill/>
-          </a:ln>
-        </p:spPr>
-        <p:txBody>
-          <a:bodyPr lIns="91440" rIns="91440" tIns="91440" bIns="91440" anchor="t">
-            <a:normAutofit fontScale="50000" lnSpcReduction="20000"/>
-          </a:bodyPr>
-          <a:p>
-            <a:pPr marL="432000" indent="-324000">
-              <a:spcBef>
-                <a:spcPts val="1417"/>
-              </a:spcBef>
-              <a:buClr>
-                <a:srgbClr val="000000"/>
-              </a:buClr>
-              <a:buSzPct val="45000"/>
-              <a:buFont typeface="Wingdings" charset="2"/>
-              <a:buChar char=""/>
-            </a:pPr>
-            <a:r>
-              <a:rPr b="0" lang="en-US" sz="1800" spc="-1" strike="noStrike">
-                <a:solidFill>
-                  <a:srgbClr val="000000"/>
-                </a:solidFill>
-                <a:latin typeface="Arial"/>
-              </a:rPr>
-              <a:t>Click to edit the outline text format</a:t>
-            </a:r>
-            <a:endParaRPr b="0" lang="en-US" sz="1800" spc="-1" strike="noStrike">
-              <a:solidFill>
-                <a:srgbClr val="000000"/>
-              </a:solidFill>
-              <a:latin typeface="Arial"/>
-            </a:endParaRPr>
-          </a:p>
-          <a:p>
-            <a:pPr lvl="1" marL="864000" indent="-324000">
-              <a:spcBef>
-                <a:spcPts val="1134"/>
-              </a:spcBef>
-              <a:buClr>
-                <a:srgbClr val="000000"/>
-              </a:buClr>
-              <a:buSzPct val="75000"/>
-              <a:buFont typeface="Symbol" charset="2"/>
-              <a:buChar char=""/>
-            </a:pPr>
-            <a:r>
-              <a:rPr b="0" lang="en-US" sz="1800" spc="-1" strike="noStrike">
-                <a:solidFill>
-                  <a:srgbClr val="000000"/>
-                </a:solidFill>
-                <a:latin typeface="Arial"/>
-              </a:rPr>
-              <a:t>Second Outline Level</a:t>
-            </a:r>
-            <a:endParaRPr b="0" lang="en-US" sz="1800" spc="-1" strike="noStrike">
-              <a:solidFill>
-                <a:srgbClr val="000000"/>
-              </a:solidFill>
-              <a:latin typeface="Arial"/>
-            </a:endParaRPr>
-          </a:p>
-          <a:p>
-            <a:pPr lvl="2" marL="1296000" indent="-288000">
-              <a:spcBef>
-                <a:spcPts val="850"/>
-              </a:spcBef>
-              <a:buClr>
-                <a:srgbClr val="000000"/>
-              </a:buClr>
-              <a:buSzPct val="45000"/>
-              <a:buFont typeface="Wingdings" charset="2"/>
-              <a:buChar char=""/>
-            </a:pPr>
-            <a:r>
-              <a:rPr b="0" lang="en-US" sz="1800" spc="-1" strike="noStrike">
-                <a:solidFill>
-                  <a:srgbClr val="000000"/>
-                </a:solidFill>
-                <a:latin typeface="Arial"/>
-              </a:rPr>
-              <a:t>Third Outline Level</a:t>
-            </a:r>
-            <a:endParaRPr b="0" lang="en-US" sz="1800" spc="-1" strike="noStrike">
-              <a:solidFill>
-                <a:srgbClr val="000000"/>
-              </a:solidFill>
-              <a:latin typeface="Arial"/>
-            </a:endParaRPr>
-          </a:p>
-          <a:p>
-            <a:pPr lvl="3" marL="1728000" indent="-216000">
-              <a:spcBef>
-                <a:spcPts val="567"/>
-              </a:spcBef>
-              <a:buClr>
-                <a:srgbClr val="000000"/>
-              </a:buClr>
-              <a:buSzPct val="75000"/>
-              <a:buFont typeface="Symbol" charset="2"/>
-              <a:buChar char=""/>
-            </a:pPr>
-            <a:r>
-              <a:rPr b="0" lang="en-US" sz="1800" spc="-1" strike="noStrike">
-                <a:solidFill>
-                  <a:srgbClr val="000000"/>
-                </a:solidFill>
-                <a:latin typeface="Arial"/>
-              </a:rPr>
-              <a:t>Fourth Outline Level</a:t>
-            </a:r>
-            <a:endParaRPr b="0" lang="en-US" sz="1800" spc="-1" strike="noStrike">
-              <a:solidFill>
-                <a:srgbClr val="000000"/>
-              </a:solidFill>
-              <a:latin typeface="Arial"/>
-            </a:endParaRPr>
-          </a:p>
-          <a:p>
-            <a:pPr lvl="4" marL="2160000" indent="-216000">
-              <a:spcBef>
-                <a:spcPts val="283"/>
-              </a:spcBef>
-              <a:buClr>
-                <a:srgbClr val="000000"/>
-              </a:buClr>
-              <a:buSzPct val="45000"/>
-              <a:buFont typeface="Wingdings" charset="2"/>
-              <a:buChar char=""/>
-            </a:pPr>
-            <a:r>
-              <a:rPr b="0" lang="en-US" sz="1800" spc="-1" strike="noStrike">
-                <a:solidFill>
-                  <a:srgbClr val="000000"/>
-                </a:solidFill>
-                <a:latin typeface="Arial"/>
-              </a:rPr>
-              <a:t>Fifth Outline Level</a:t>
-            </a:r>
-            <a:endParaRPr b="0" lang="en-US" sz="1800" spc="-1" strike="noStrike">
-              <a:solidFill>
-                <a:srgbClr val="000000"/>
-              </a:solidFill>
-              <a:latin typeface="Arial"/>
-            </a:endParaRPr>
-          </a:p>
-          <a:p>
-            <a:pPr lvl="5" marL="2592000" indent="-216000">
-              <a:spcBef>
-                <a:spcPts val="283"/>
-              </a:spcBef>
-              <a:buClr>
-                <a:srgbClr val="000000"/>
-              </a:buClr>
-              <a:buSzPct val="45000"/>
-              <a:buFont typeface="Wingdings" charset="2"/>
-              <a:buChar char=""/>
-            </a:pPr>
-            <a:r>
-              <a:rPr b="0" lang="en-US" sz="1800" spc="-1" strike="noStrike">
-                <a:solidFill>
-                  <a:srgbClr val="000000"/>
-                </a:solidFill>
-                <a:latin typeface="Arial"/>
-              </a:rPr>
-              <a:t>Sixth Outline Level</a:t>
-            </a:r>
-            <a:endParaRPr b="0" lang="en-US" sz="1800" spc="-1" strike="noStrike">
-              <a:solidFill>
-                <a:srgbClr val="000000"/>
-              </a:solidFill>
-              <a:latin typeface="Arial"/>
-            </a:endParaRPr>
-          </a:p>
-          <a:p>
-            <a:pPr lvl="6" marL="3024000" indent="-216000">
-              <a:spcBef>
-                <a:spcPts val="283"/>
-              </a:spcBef>
-              <a:buClr>
-                <a:srgbClr val="000000"/>
-              </a:buClr>
-              <a:buSzPct val="45000"/>
-              <a:buFont typeface="Wingdings" charset="2"/>
-              <a:buChar char=""/>
-            </a:pPr>
-            <a:r>
-              <a:rPr b="0" lang="en-US" sz="1800" spc="-1" strike="noStrike">
-                <a:solidFill>
-                  <a:srgbClr val="000000"/>
-                </a:solidFill>
-                <a:latin typeface="Arial"/>
-              </a:rPr>
-              <a:t>Seventh Outline Level</a:t>
-            </a:r>
-            <a:endParaRPr b="0" lang="en-US" sz="1800" spc="-1" strike="noStrike">
-              <a:solidFill>
-                <a:srgbClr val="000000"/>
-              </a:solidFill>
-              <a:latin typeface="Arial"/>
-            </a:endParaRPr>
-          </a:p>
-        </p:txBody>
-      </p:sp>
-      <p:sp>
-        <p:nvSpPr>
-          <p:cNvPr id="7" name="PlaceHolder 3"/>
-          <p:cNvSpPr>
-            <a:spLocks noGrp="1"/>
-          </p:cNvSpPr>
-          <p:nvPr>
             <p:ph type="sldNum" idx="2"/>
           </p:nvPr>
         </p:nvSpPr>
         <p:spPr>
           <a:xfrm>
             <a:off x="8472600" y="4663080"/>
-            <a:ext cx="548280" cy="393120"/>
+            <a:ext cx="547920" cy="392760"/>
           </a:xfrm>
           <a:prstGeom prst="rect">
             <a:avLst/>
@@ -2289,7 +1513,7 @@
         </p:spPr>
         <p:txBody>
           <a:bodyPr lIns="91440" rIns="91440" tIns="91440" bIns="91440" anchor="ctr">
-            <a:normAutofit/>
+            <a:noAutofit/>
           </a:bodyPr>
           <a:lstStyle>
             <a:lvl1pPr indent="0" algn="r">
@@ -2319,7 +1543,7 @@
                 <a:tab algn="l" pos="0"/>
               </a:tabLst>
             </a:pPr>
-            <a:fld id="{32969529-D28F-44AC-BD93-039101C7ED0E}" type="slidenum">
+            <a:fld id="{DBAC43D5-BCAE-4C88-8116-9C1A36B45FBD}" type="slidenum">
               <a:rPr b="0" lang="en" sz="1000" spc="-1" strike="noStrike">
                 <a:solidFill>
                   <a:schemeClr val="dk2"/>
@@ -2373,7 +1597,7 @@
       </p:grpSpPr>
       <p:sp>
         <p:nvSpPr>
-          <p:cNvPr id="8" name="PlaceHolder 1"/>
+          <p:cNvPr id="6" name="PlaceHolder 1"/>
           <p:cNvSpPr>
             <a:spLocks noGrp="1"/>
           </p:cNvSpPr>
@@ -2384,7 +1608,7 @@
         <p:spPr>
           <a:xfrm>
             <a:off x="8472600" y="4663080"/>
-            <a:ext cx="548280" cy="393120"/>
+            <a:ext cx="547920" cy="392760"/>
           </a:xfrm>
           <a:prstGeom prst="rect">
             <a:avLst/>
@@ -2396,7 +1620,7 @@
         </p:spPr>
         <p:txBody>
           <a:bodyPr lIns="91440" rIns="91440" tIns="91440" bIns="91440" anchor="ctr">
-            <a:normAutofit/>
+            <a:noAutofit/>
           </a:bodyPr>
           <a:lstStyle>
             <a:lvl1pPr indent="0" algn="r">
@@ -2426,7 +1650,7 @@
                 <a:tab algn="l" pos="0"/>
               </a:tabLst>
             </a:pPr>
-            <a:fld id="{E9E3BE54-D505-4007-8B82-59A361550E31}" type="slidenum">
+            <a:fld id="{13B1C095-0909-44A1-89D4-6AAFF7F4DE0B}" type="slidenum">
               <a:rPr b="0" lang="en" sz="1000" spc="-1" strike="noStrike">
                 <a:solidFill>
                   <a:schemeClr val="dk2"/>
@@ -2480,18 +1704,18 @@
       </p:grpSpPr>
       <p:sp>
         <p:nvSpPr>
-          <p:cNvPr id="9" name="PlaceHolder 1"/>
+          <p:cNvPr id="7" name="PlaceHolder 1"/>
           <p:cNvSpPr>
             <a:spLocks noGrp="1"/>
           </p:cNvSpPr>
           <p:nvPr>
-            <p:ph type="title"/>
+            <p:ph type="sldNum" idx="4"/>
           </p:nvPr>
         </p:nvSpPr>
         <p:spPr>
           <a:xfrm>
-            <a:off x="311760" y="2151000"/>
-            <a:ext cx="8520120" cy="841320"/>
+            <a:off x="8472600" y="4663080"/>
+            <a:ext cx="547920" cy="392760"/>
           </a:xfrm>
           <a:prstGeom prst="rect">
             <a:avLst/>
@@ -2503,56 +1727,7 @@
         </p:spPr>
         <p:txBody>
           <a:bodyPr lIns="91440" rIns="91440" tIns="91440" bIns="91440" anchor="ctr">
-            <a:normAutofit/>
-          </a:bodyPr>
-          <a:p>
-            <a:pPr indent="0">
-              <a:buNone/>
-            </a:pPr>
-            <a:r>
-              <a:rPr b="0" lang="en-US" sz="3600" spc="-1" strike="noStrike">
-                <a:solidFill>
-                  <a:srgbClr val="000000"/>
-                </a:solidFill>
-                <a:latin typeface="Arial"/>
-              </a:rPr>
-              <a:t>Click to edit the title text format</a:t>
-            </a:r>
-            <a:endParaRPr b="0" lang="en-US" sz="3600" spc="-1" strike="noStrike">
-              <a:solidFill>
-                <a:srgbClr val="000000"/>
-              </a:solidFill>
-              <a:latin typeface="Arial"/>
-            </a:endParaRPr>
-          </a:p>
-        </p:txBody>
-      </p:sp>
-      <p:sp>
-        <p:nvSpPr>
-          <p:cNvPr id="10" name="PlaceHolder 2"/>
-          <p:cNvSpPr>
-            <a:spLocks noGrp="1"/>
-          </p:cNvSpPr>
-          <p:nvPr>
-            <p:ph type="sldNum" idx="4"/>
-          </p:nvPr>
-        </p:nvSpPr>
-        <p:spPr>
-          <a:xfrm>
-            <a:off x="8472600" y="4663080"/>
-            <a:ext cx="548280" cy="393120"/>
-          </a:xfrm>
-          <a:prstGeom prst="rect">
-            <a:avLst/>
-          </a:prstGeom>
-          <a:noFill/>
-          <a:ln w="0">
-            <a:noFill/>
-          </a:ln>
-        </p:spPr>
-        <p:txBody>
-          <a:bodyPr lIns="91440" rIns="91440" tIns="91440" bIns="91440" anchor="ctr">
-            <a:normAutofit/>
+            <a:noAutofit/>
           </a:bodyPr>
           <a:lstStyle>
             <a:lvl1pPr indent="0" algn="r">
@@ -2582,7 +1757,7 @@
                 <a:tab algn="l" pos="0"/>
               </a:tabLst>
             </a:pPr>
-            <a:fld id="{31961669-939B-41E5-8353-73FBC3CD6015}" type="slidenum">
+            <a:fld id="{3E9D6354-AE90-49E5-9B96-58D488EDA120}" type="slidenum">
               <a:rPr b="0" lang="en" sz="1000" spc="-1" strike="noStrike">
                 <a:solidFill>
                   <a:schemeClr val="dk2"/>
@@ -2636,7 +1811,7 @@
       </p:grpSpPr>
       <p:sp>
         <p:nvSpPr>
-          <p:cNvPr id="11" name="PlaceHolder 1"/>
+          <p:cNvPr id="8" name="PlaceHolder 1"/>
           <p:cNvSpPr>
             <a:spLocks noGrp="1"/>
           </p:cNvSpPr>
@@ -2647,7 +1822,7 @@
         <p:spPr>
           <a:xfrm>
             <a:off x="311760" y="444960"/>
-            <a:ext cx="8520120" cy="572400"/>
+            <a:ext cx="8519760" cy="572040"/>
           </a:xfrm>
           <a:prstGeom prst="rect">
             <a:avLst/>
@@ -2658,15 +1833,15 @@
           </a:ln>
         </p:spPr>
         <p:txBody>
-          <a:bodyPr lIns="91440" rIns="91440" tIns="91440" bIns="91440" anchor="t">
-            <a:normAutofit fontScale="93550"/>
+          <a:bodyPr lIns="0" rIns="0" tIns="0" bIns="0" anchor="ctr">
+            <a:noAutofit/>
           </a:bodyPr>
           <a:p>
             <a:pPr indent="0">
               <a:buNone/>
             </a:pPr>
             <a:r>
-              <a:rPr b="0" lang="en-US" sz="2800" spc="-1" strike="noStrike">
+              <a:rPr b="0" lang="en-US" sz="1800" spc="-1" strike="noStrike">
                 <a:solidFill>
                   <a:srgbClr val="000000"/>
                 </a:solidFill>
@@ -2674,7 +1849,7 @@
               </a:rPr>
               <a:t>Click to edit the title text format</a:t>
             </a:r>
-            <a:endParaRPr b="0" lang="en-US" sz="2800" spc="-1" strike="noStrike">
+            <a:endParaRPr b="0" lang="en-US" sz="1800" spc="-1" strike="noStrike">
               <a:solidFill>
                 <a:srgbClr val="000000"/>
               </a:solidFill>
@@ -2685,7 +1860,7 @@
       </p:sp>
       <p:sp>
         <p:nvSpPr>
-          <p:cNvPr id="12" name="PlaceHolder 2"/>
+          <p:cNvPr id="9" name="PlaceHolder 2"/>
           <p:cNvSpPr>
             <a:spLocks noGrp="1"/>
           </p:cNvSpPr>
@@ -2696,7 +1871,7 @@
         <p:spPr>
           <a:xfrm>
             <a:off x="311760" y="1152360"/>
-            <a:ext cx="8520120" cy="3416040"/>
+            <a:ext cx="8519760" cy="3415680"/>
           </a:xfrm>
           <a:prstGeom prst="rect">
             <a:avLst/>
@@ -2707,7 +1882,7 @@
           </a:ln>
         </p:spPr>
         <p:txBody>
-          <a:bodyPr lIns="91440" rIns="91440" tIns="91440" bIns="91440" anchor="t">
+          <a:bodyPr lIns="0" rIns="0" tIns="0" bIns="0" anchor="t">
             <a:normAutofit/>
           </a:bodyPr>
           <a:p>
@@ -2910,7 +2085,7 @@
       </p:sp>
       <p:sp>
         <p:nvSpPr>
-          <p:cNvPr id="13" name="PlaceHolder 3"/>
+          <p:cNvPr id="10" name="PlaceHolder 3"/>
           <p:cNvSpPr>
             <a:spLocks noGrp="1"/>
           </p:cNvSpPr>
@@ -2921,7 +2096,7 @@
         <p:spPr>
           <a:xfrm>
             <a:off x="8472600" y="4663080"/>
-            <a:ext cx="548280" cy="393120"/>
+            <a:ext cx="547920" cy="392760"/>
           </a:xfrm>
           <a:prstGeom prst="rect">
             <a:avLst/>
@@ -2933,7 +2108,7 @@
         </p:spPr>
         <p:txBody>
           <a:bodyPr lIns="91440" rIns="91440" tIns="91440" bIns="91440" anchor="ctr">
-            <a:normAutofit/>
+            <a:noAutofit/>
           </a:bodyPr>
           <a:lstStyle>
             <a:lvl1pPr indent="0" algn="r">
@@ -2963,7 +2138,7 @@
                 <a:tab algn="l" pos="0"/>
               </a:tabLst>
             </a:pPr>
-            <a:fld id="{1C5368EE-181E-4422-8407-D00064F29A73}" type="slidenum">
+            <a:fld id="{CFD664C6-E928-49C7-938C-6BCACCD172A8}" type="slidenum">
               <a:rPr b="0" lang="en" sz="1000" spc="-1" strike="noStrike">
                 <a:solidFill>
                   <a:schemeClr val="dk2"/>
@@ -3017,7 +2192,7 @@
       </p:grpSpPr>
       <p:sp>
         <p:nvSpPr>
-          <p:cNvPr id="16" name="PlaceHolder 1"/>
+          <p:cNvPr id="13" name="PlaceHolder 1"/>
           <p:cNvSpPr>
             <a:spLocks noGrp="1"/>
           </p:cNvSpPr>
@@ -3028,7 +2203,7 @@
         <p:spPr>
           <a:xfrm>
             <a:off x="311760" y="444960"/>
-            <a:ext cx="8520120" cy="572400"/>
+            <a:ext cx="8519760" cy="572040"/>
           </a:xfrm>
           <a:prstGeom prst="rect">
             <a:avLst/>
@@ -3039,15 +2214,15 @@
           </a:ln>
         </p:spPr>
         <p:txBody>
-          <a:bodyPr lIns="91440" rIns="91440" tIns="91440" bIns="91440" anchor="t">
-            <a:normAutofit fontScale="93550"/>
+          <a:bodyPr lIns="0" rIns="0" tIns="0" bIns="0" anchor="ctr">
+            <a:noAutofit/>
           </a:bodyPr>
           <a:p>
             <a:pPr indent="0">
               <a:buNone/>
             </a:pPr>
             <a:r>
-              <a:rPr b="0" lang="en-US" sz="2800" spc="-1" strike="noStrike">
+              <a:rPr b="0" lang="en-US" sz="1800" spc="-1" strike="noStrike">
                 <a:solidFill>
                   <a:srgbClr val="000000"/>
                 </a:solidFill>
@@ -3055,7 +2230,7 @@
               </a:rPr>
               <a:t>Click to edit the title text format</a:t>
             </a:r>
-            <a:endParaRPr b="0" lang="en-US" sz="2800" spc="-1" strike="noStrike">
+            <a:endParaRPr b="0" lang="en-US" sz="1800" spc="-1" strike="noStrike">
               <a:solidFill>
                 <a:srgbClr val="000000"/>
               </a:solidFill>
@@ -3066,7 +2241,7 @@
       </p:sp>
       <p:sp>
         <p:nvSpPr>
-          <p:cNvPr id="17" name="PlaceHolder 2"/>
+          <p:cNvPr id="14" name="PlaceHolder 2"/>
           <p:cNvSpPr>
             <a:spLocks noGrp="1"/>
           </p:cNvSpPr>
@@ -3077,7 +2252,7 @@
         <p:spPr>
           <a:xfrm>
             <a:off x="311760" y="1152360"/>
-            <a:ext cx="3999600" cy="3416040"/>
+            <a:ext cx="4157280" cy="3415680"/>
           </a:xfrm>
           <a:prstGeom prst="rect">
             <a:avLst/>
@@ -3088,7 +2263,7 @@
           </a:ln>
         </p:spPr>
         <p:txBody>
-          <a:bodyPr lIns="91440" rIns="91440" tIns="91440" bIns="91440" anchor="t">
+          <a:bodyPr lIns="0" rIns="0" tIns="0" bIns="0" anchor="t">
             <a:normAutofit/>
           </a:bodyPr>
           <a:p>
@@ -3104,7 +2279,7 @@
               <a:buChar char=""/>
             </a:pPr>
             <a:r>
-              <a:rPr b="0" lang="en-US" sz="1400" spc="-1" strike="noStrike">
+              <a:rPr b="0" lang="en-US" sz="1800" spc="-1" strike="noStrike">
                 <a:solidFill>
                   <a:srgbClr val="000000"/>
                 </a:solidFill>
@@ -3112,7 +2287,7 @@
               </a:rPr>
               <a:t>Click to edit the outline text format</a:t>
             </a:r>
-            <a:endParaRPr b="0" lang="en-US" sz="1400" spc="-1" strike="noStrike">
+            <a:endParaRPr b="0" lang="en-US" sz="1800" spc="-1" strike="noStrike">
               <a:solidFill>
                 <a:srgbClr val="000000"/>
               </a:solidFill>
@@ -3132,7 +2307,7 @@
               <a:buChar char=""/>
             </a:pPr>
             <a:r>
-              <a:rPr b="0" lang="en-US" sz="1400" spc="-1" strike="noStrike">
+              <a:rPr b="0" lang="en-US" sz="1800" spc="-1" strike="noStrike">
                 <a:solidFill>
                   <a:srgbClr val="000000"/>
                 </a:solidFill>
@@ -3140,7 +2315,7 @@
               </a:rPr>
               <a:t>Second Outline Level</a:t>
             </a:r>
-            <a:endParaRPr b="0" lang="en-US" sz="1400" spc="-1" strike="noStrike">
+            <a:endParaRPr b="0" lang="en-US" sz="1800" spc="-1" strike="noStrike">
               <a:solidFill>
                 <a:srgbClr val="000000"/>
               </a:solidFill>
@@ -3160,7 +2335,7 @@
               <a:buChar char=""/>
             </a:pPr>
             <a:r>
-              <a:rPr b="0" lang="en-US" sz="1400" spc="-1" strike="noStrike">
+              <a:rPr b="0" lang="en-US" sz="1800" spc="-1" strike="noStrike">
                 <a:solidFill>
                   <a:srgbClr val="000000"/>
                 </a:solidFill>
@@ -3168,7 +2343,7 @@
               </a:rPr>
               <a:t>Third Outline Level</a:t>
             </a:r>
-            <a:endParaRPr b="0" lang="en-US" sz="1400" spc="-1" strike="noStrike">
+            <a:endParaRPr b="0" lang="en-US" sz="1800" spc="-1" strike="noStrike">
               <a:solidFill>
                 <a:srgbClr val="000000"/>
               </a:solidFill>
@@ -3188,7 +2363,7 @@
               <a:buChar char=""/>
             </a:pPr>
             <a:r>
-              <a:rPr b="0" lang="en-US" sz="1400" spc="-1" strike="noStrike">
+              <a:rPr b="0" lang="en-US" sz="1800" spc="-1" strike="noStrike">
                 <a:solidFill>
                   <a:srgbClr val="000000"/>
                 </a:solidFill>
@@ -3196,7 +2371,7 @@
               </a:rPr>
               <a:t>Fourth Outline Level</a:t>
             </a:r>
-            <a:endParaRPr b="0" lang="en-US" sz="1400" spc="-1" strike="noStrike">
+            <a:endParaRPr b="0" lang="en-US" sz="1800" spc="-1" strike="noStrike">
               <a:solidFill>
                 <a:srgbClr val="000000"/>
               </a:solidFill>
@@ -3216,7 +2391,7 @@
               <a:buChar char=""/>
             </a:pPr>
             <a:r>
-              <a:rPr b="0" lang="en-US" sz="1400" spc="-1" strike="noStrike">
+              <a:rPr b="0" lang="en-US" sz="1800" spc="-1" strike="noStrike">
                 <a:solidFill>
                   <a:srgbClr val="000000"/>
                 </a:solidFill>
@@ -3224,7 +2399,7 @@
               </a:rPr>
               <a:t>Fifth Outline Level</a:t>
             </a:r>
-            <a:endParaRPr b="0" lang="en-US" sz="1400" spc="-1" strike="noStrike">
+            <a:endParaRPr b="0" lang="en-US" sz="1800" spc="-1" strike="noStrike">
               <a:solidFill>
                 <a:srgbClr val="000000"/>
               </a:solidFill>
@@ -3244,7 +2419,7 @@
               <a:buChar char=""/>
             </a:pPr>
             <a:r>
-              <a:rPr b="0" lang="en-US" sz="1400" spc="-1" strike="noStrike">
+              <a:rPr b="0" lang="en-US" sz="1800" spc="-1" strike="noStrike">
                 <a:solidFill>
                   <a:srgbClr val="000000"/>
                 </a:solidFill>
@@ -3252,7 +2427,7 @@
               </a:rPr>
               <a:t>Sixth Outline Level</a:t>
             </a:r>
-            <a:endParaRPr b="0" lang="en-US" sz="1400" spc="-1" strike="noStrike">
+            <a:endParaRPr b="0" lang="en-US" sz="1800" spc="-1" strike="noStrike">
               <a:solidFill>
                 <a:srgbClr val="000000"/>
               </a:solidFill>
@@ -3272,7 +2447,7 @@
               <a:buChar char=""/>
             </a:pPr>
             <a:r>
-              <a:rPr b="0" lang="en-US" sz="1400" spc="-1" strike="noStrike">
+              <a:rPr b="0" lang="en-US" sz="1800" spc="-1" strike="noStrike">
                 <a:solidFill>
                   <a:srgbClr val="000000"/>
                 </a:solidFill>
@@ -3280,7 +2455,7 @@
               </a:rPr>
               <a:t>Seventh Outline Level</a:t>
             </a:r>
-            <a:endParaRPr b="0" lang="en-US" sz="1400" spc="-1" strike="noStrike">
+            <a:endParaRPr b="0" lang="en-US" sz="1800" spc="-1" strike="noStrike">
               <a:solidFill>
                 <a:srgbClr val="000000"/>
               </a:solidFill>
@@ -3291,7 +2466,7 @@
       </p:sp>
       <p:sp>
         <p:nvSpPr>
-          <p:cNvPr id="18" name="PlaceHolder 3"/>
+          <p:cNvPr id="15" name="PlaceHolder 3"/>
           <p:cNvSpPr>
             <a:spLocks noGrp="1"/>
           </p:cNvSpPr>
@@ -3301,8 +2476,8 @@
         </p:nvSpPr>
         <p:spPr>
           <a:xfrm>
-            <a:off x="4832280" y="1152360"/>
-            <a:ext cx="3999600" cy="3416040"/>
+            <a:off x="4677840" y="1152360"/>
+            <a:ext cx="4157280" cy="3415680"/>
           </a:xfrm>
           <a:prstGeom prst="rect">
             <a:avLst/>
@@ -3313,7 +2488,7 @@
           </a:ln>
         </p:spPr>
         <p:txBody>
-          <a:bodyPr lIns="91440" rIns="91440" tIns="91440" bIns="91440" anchor="t">
+          <a:bodyPr lIns="0" rIns="0" tIns="0" bIns="0" anchor="t">
             <a:normAutofit/>
           </a:bodyPr>
           <a:p>
@@ -3329,7 +2504,7 @@
               <a:buChar char=""/>
             </a:pPr>
             <a:r>
-              <a:rPr b="0" lang="en-US" sz="1400" spc="-1" strike="noStrike">
+              <a:rPr b="0" lang="en-US" sz="1800" spc="-1" strike="noStrike">
                 <a:solidFill>
                   <a:srgbClr val="000000"/>
                 </a:solidFill>
@@ -3337,7 +2512,7 @@
               </a:rPr>
               <a:t>Click to edit the outline text format</a:t>
             </a:r>
-            <a:endParaRPr b="0" lang="en-US" sz="1400" spc="-1" strike="noStrike">
+            <a:endParaRPr b="0" lang="en-US" sz="1800" spc="-1" strike="noStrike">
               <a:solidFill>
                 <a:srgbClr val="000000"/>
               </a:solidFill>
@@ -3357,7 +2532,7 @@
               <a:buChar char=""/>
             </a:pPr>
             <a:r>
-              <a:rPr b="0" lang="en-US" sz="1400" spc="-1" strike="noStrike">
+              <a:rPr b="0" lang="en-US" sz="1800" spc="-1" strike="noStrike">
                 <a:solidFill>
                   <a:srgbClr val="000000"/>
                 </a:solidFill>
@@ -3365,7 +2540,7 @@
               </a:rPr>
               <a:t>Second Outline Level</a:t>
             </a:r>
-            <a:endParaRPr b="0" lang="en-US" sz="1400" spc="-1" strike="noStrike">
+            <a:endParaRPr b="0" lang="en-US" sz="1800" spc="-1" strike="noStrike">
               <a:solidFill>
                 <a:srgbClr val="000000"/>
               </a:solidFill>
@@ -3385,7 +2560,7 @@
               <a:buChar char=""/>
             </a:pPr>
             <a:r>
-              <a:rPr b="0" lang="en-US" sz="1400" spc="-1" strike="noStrike">
+              <a:rPr b="0" lang="en-US" sz="1800" spc="-1" strike="noStrike">
                 <a:solidFill>
                   <a:srgbClr val="000000"/>
                 </a:solidFill>
@@ -3393,7 +2568,7 @@
               </a:rPr>
               <a:t>Third Outline Level</a:t>
             </a:r>
-            <a:endParaRPr b="0" lang="en-US" sz="1400" spc="-1" strike="noStrike">
+            <a:endParaRPr b="0" lang="en-US" sz="1800" spc="-1" strike="noStrike">
               <a:solidFill>
                 <a:srgbClr val="000000"/>
               </a:solidFill>
@@ -3413,7 +2588,7 @@
               <a:buChar char=""/>
             </a:pPr>
             <a:r>
-              <a:rPr b="0" lang="en-US" sz="1400" spc="-1" strike="noStrike">
+              <a:rPr b="0" lang="en-US" sz="1800" spc="-1" strike="noStrike">
                 <a:solidFill>
                   <a:srgbClr val="000000"/>
                 </a:solidFill>
@@ -3421,7 +2596,7 @@
               </a:rPr>
               <a:t>Fourth Outline Level</a:t>
             </a:r>
-            <a:endParaRPr b="0" lang="en-US" sz="1400" spc="-1" strike="noStrike">
+            <a:endParaRPr b="0" lang="en-US" sz="1800" spc="-1" strike="noStrike">
               <a:solidFill>
                 <a:srgbClr val="000000"/>
               </a:solidFill>
@@ -3441,7 +2616,7 @@
               <a:buChar char=""/>
             </a:pPr>
             <a:r>
-              <a:rPr b="0" lang="en-US" sz="1400" spc="-1" strike="noStrike">
+              <a:rPr b="0" lang="en-US" sz="1800" spc="-1" strike="noStrike">
                 <a:solidFill>
                   <a:srgbClr val="000000"/>
                 </a:solidFill>
@@ -3449,7 +2624,7 @@
               </a:rPr>
               <a:t>Fifth Outline Level</a:t>
             </a:r>
-            <a:endParaRPr b="0" lang="en-US" sz="1400" spc="-1" strike="noStrike">
+            <a:endParaRPr b="0" lang="en-US" sz="1800" spc="-1" strike="noStrike">
               <a:solidFill>
                 <a:srgbClr val="000000"/>
               </a:solidFill>
@@ -3469,7 +2644,7 @@
               <a:buChar char=""/>
             </a:pPr>
             <a:r>
-              <a:rPr b="0" lang="en-US" sz="1400" spc="-1" strike="noStrike">
+              <a:rPr b="0" lang="en-US" sz="1800" spc="-1" strike="noStrike">
                 <a:solidFill>
                   <a:srgbClr val="000000"/>
                 </a:solidFill>
@@ -3477,7 +2652,7 @@
               </a:rPr>
               <a:t>Sixth Outline Level</a:t>
             </a:r>
-            <a:endParaRPr b="0" lang="en-US" sz="1400" spc="-1" strike="noStrike">
+            <a:endParaRPr b="0" lang="en-US" sz="1800" spc="-1" strike="noStrike">
               <a:solidFill>
                 <a:srgbClr val="000000"/>
               </a:solidFill>
@@ -3497,7 +2672,7 @@
               <a:buChar char=""/>
             </a:pPr>
             <a:r>
-              <a:rPr b="0" lang="en-US" sz="1400" spc="-1" strike="noStrike">
+              <a:rPr b="0" lang="en-US" sz="1800" spc="-1" strike="noStrike">
                 <a:solidFill>
                   <a:srgbClr val="000000"/>
                 </a:solidFill>
@@ -3505,7 +2680,7 @@
               </a:rPr>
               <a:t>Seventh Outline Level</a:t>
             </a:r>
-            <a:endParaRPr b="0" lang="en-US" sz="1400" spc="-1" strike="noStrike">
+            <a:endParaRPr b="0" lang="en-US" sz="1800" spc="-1" strike="noStrike">
               <a:solidFill>
                 <a:srgbClr val="000000"/>
               </a:solidFill>
@@ -3516,7 +2691,7 @@
       </p:sp>
       <p:sp>
         <p:nvSpPr>
-          <p:cNvPr id="19" name="PlaceHolder 4"/>
+          <p:cNvPr id="16" name="PlaceHolder 4"/>
           <p:cNvSpPr>
             <a:spLocks noGrp="1"/>
           </p:cNvSpPr>
@@ -3527,7 +2702,7 @@
         <p:spPr>
           <a:xfrm>
             <a:off x="8472600" y="4663080"/>
-            <a:ext cx="548280" cy="393120"/>
+            <a:ext cx="547920" cy="392760"/>
           </a:xfrm>
           <a:prstGeom prst="rect">
             <a:avLst/>
@@ -3539,7 +2714,7 @@
         </p:spPr>
         <p:txBody>
           <a:bodyPr lIns="91440" rIns="91440" tIns="91440" bIns="91440" anchor="ctr">
-            <a:normAutofit/>
+            <a:noAutofit/>
           </a:bodyPr>
           <a:lstStyle>
             <a:lvl1pPr indent="0" algn="r">
@@ -3569,7 +2744,7 @@
                 <a:tab algn="l" pos="0"/>
               </a:tabLst>
             </a:pPr>
-            <a:fld id="{96DD47B5-E419-498F-81FF-F34363282BDD}" type="slidenum">
+            <a:fld id="{918459D2-58A2-4A43-BB60-8958BC6F71D8}" type="slidenum">
               <a:rPr b="0" lang="en" sz="1000" spc="-1" strike="noStrike">
                 <a:solidFill>
                   <a:schemeClr val="dk2"/>
@@ -3623,7 +2798,7 @@
       </p:grpSpPr>
       <p:sp>
         <p:nvSpPr>
-          <p:cNvPr id="23" name="PlaceHolder 1"/>
+          <p:cNvPr id="20" name="PlaceHolder 1"/>
           <p:cNvSpPr>
             <a:spLocks noGrp="1"/>
           </p:cNvSpPr>
@@ -3634,7 +2809,7 @@
         <p:spPr>
           <a:xfrm>
             <a:off x="311760" y="444960"/>
-            <a:ext cx="8520120" cy="572400"/>
+            <a:ext cx="8519760" cy="572040"/>
           </a:xfrm>
           <a:prstGeom prst="rect">
             <a:avLst/>
@@ -3645,15 +2820,15 @@
           </a:ln>
         </p:spPr>
         <p:txBody>
-          <a:bodyPr lIns="91440" rIns="91440" tIns="91440" bIns="91440" anchor="t">
-            <a:normAutofit fontScale="93550"/>
+          <a:bodyPr lIns="0" rIns="0" tIns="0" bIns="0" anchor="ctr">
+            <a:noAutofit/>
           </a:bodyPr>
           <a:p>
             <a:pPr indent="0">
               <a:buNone/>
             </a:pPr>
             <a:r>
-              <a:rPr b="0" lang="en-US" sz="2800" spc="-1" strike="noStrike">
+              <a:rPr b="0" lang="en-US" sz="1800" spc="-1" strike="noStrike">
                 <a:solidFill>
                   <a:srgbClr val="000000"/>
                 </a:solidFill>
@@ -3661,7 +2836,7 @@
               </a:rPr>
               <a:t>Click to edit the title text format</a:t>
             </a:r>
-            <a:endParaRPr b="0" lang="en-US" sz="2800" spc="-1" strike="noStrike">
+            <a:endParaRPr b="0" lang="en-US" sz="1800" spc="-1" strike="noStrike">
               <a:solidFill>
                 <a:srgbClr val="000000"/>
               </a:solidFill>
@@ -3672,7 +2847,7 @@
       </p:sp>
       <p:sp>
         <p:nvSpPr>
-          <p:cNvPr id="24" name="PlaceHolder 2"/>
+          <p:cNvPr id="21" name="PlaceHolder 2"/>
           <p:cNvSpPr>
             <a:spLocks noGrp="1"/>
           </p:cNvSpPr>
@@ -3683,7 +2858,7 @@
         <p:spPr>
           <a:xfrm>
             <a:off x="8472600" y="4663080"/>
-            <a:ext cx="548280" cy="393120"/>
+            <a:ext cx="547920" cy="392760"/>
           </a:xfrm>
           <a:prstGeom prst="rect">
             <a:avLst/>
@@ -3695,7 +2870,7 @@
         </p:spPr>
         <p:txBody>
           <a:bodyPr lIns="91440" rIns="91440" tIns="91440" bIns="91440" anchor="ctr">
-            <a:normAutofit/>
+            <a:noAutofit/>
           </a:bodyPr>
           <a:lstStyle>
             <a:lvl1pPr indent="0" algn="r">
@@ -3725,7 +2900,7 @@
                 <a:tab algn="l" pos="0"/>
               </a:tabLst>
             </a:pPr>
-            <a:fld id="{5E368004-AD8F-478B-8948-1B60EAEE86E8}" type="slidenum">
+            <a:fld id="{4D41B58B-0545-4B13-928C-2BB89AA8747C}" type="slidenum">
               <a:rPr b="0" lang="en" sz="1000" spc="-1" strike="noStrike">
                 <a:solidFill>
                   <a:schemeClr val="dk2"/>
@@ -3779,281 +2954,7 @@
       </p:grpSpPr>
       <p:sp>
         <p:nvSpPr>
-          <p:cNvPr id="26" name="PlaceHolder 1"/>
-          <p:cNvSpPr>
-            <a:spLocks noGrp="1"/>
-          </p:cNvSpPr>
-          <p:nvPr>
-            <p:ph type="title"/>
-          </p:nvPr>
-        </p:nvSpPr>
-        <p:spPr>
-          <a:xfrm>
-            <a:off x="311760" y="555480"/>
-            <a:ext cx="2807640" cy="755280"/>
-          </a:xfrm>
-          <a:prstGeom prst="rect">
-            <a:avLst/>
-          </a:prstGeom>
-          <a:noFill/>
-          <a:ln w="0">
-            <a:noFill/>
-          </a:ln>
-        </p:spPr>
-        <p:txBody>
-          <a:bodyPr lIns="91440" rIns="91440" tIns="91440" bIns="91440" anchor="b">
-            <a:normAutofit fontScale="81218"/>
-          </a:bodyPr>
-          <a:p>
-            <a:pPr indent="0">
-              <a:buNone/>
-            </a:pPr>
-            <a:r>
-              <a:rPr b="0" lang="en-US" sz="2400" spc="-1" strike="noStrike">
-                <a:solidFill>
-                  <a:srgbClr val="000000"/>
-                </a:solidFill>
-                <a:latin typeface="Arial"/>
-              </a:rPr>
-              <a:t>Click to edit the title text format</a:t>
-            </a:r>
-            <a:endParaRPr b="0" lang="en-US" sz="2400" spc="-1" strike="noStrike">
-              <a:solidFill>
-                <a:srgbClr val="000000"/>
-              </a:solidFill>
-              <a:latin typeface="Arial"/>
-            </a:endParaRPr>
-          </a:p>
-        </p:txBody>
-      </p:sp>
-      <p:sp>
-        <p:nvSpPr>
-          <p:cNvPr id="27" name="PlaceHolder 2"/>
-          <p:cNvSpPr>
-            <a:spLocks noGrp="1"/>
-          </p:cNvSpPr>
-          <p:nvPr>
-            <p:ph type="body"/>
-          </p:nvPr>
-        </p:nvSpPr>
-        <p:spPr>
-          <a:xfrm>
-            <a:off x="311760" y="1389600"/>
-            <a:ext cx="2807640" cy="3179160"/>
-          </a:xfrm>
-          <a:prstGeom prst="rect">
-            <a:avLst/>
-          </a:prstGeom>
-          <a:noFill/>
-          <a:ln w="0">
-            <a:noFill/>
-          </a:ln>
-        </p:spPr>
-        <p:txBody>
-          <a:bodyPr lIns="91440" rIns="91440" tIns="91440" bIns="91440" anchor="t">
-            <a:normAutofit fontScale="35861"/>
-          </a:bodyPr>
-          <a:p>
-            <a:pPr marL="432000" indent="-324000">
-              <a:spcBef>
-                <a:spcPts val="1417"/>
-              </a:spcBef>
-              <a:buClr>
-                <a:srgbClr val="000000"/>
-              </a:buClr>
-              <a:buSzPct val="45000"/>
-              <a:buFont typeface="Wingdings" charset="2"/>
-              <a:buChar char=""/>
-            </a:pPr>
-            <a:r>
-              <a:rPr b="0" lang="en-US" sz="1200" spc="-1" strike="noStrike">
-                <a:solidFill>
-                  <a:srgbClr val="000000"/>
-                </a:solidFill>
-                <a:latin typeface="Arial"/>
-              </a:rPr>
-              <a:t>Click to edit the outline text format</a:t>
-            </a:r>
-            <a:endParaRPr b="0" lang="en-US" sz="1200" spc="-1" strike="noStrike">
-              <a:solidFill>
-                <a:srgbClr val="000000"/>
-              </a:solidFill>
-              <a:latin typeface="Arial"/>
-            </a:endParaRPr>
-          </a:p>
-          <a:p>
-            <a:pPr lvl="1" marL="864000" indent="-324000">
-              <a:spcBef>
-                <a:spcPts val="1134"/>
-              </a:spcBef>
-              <a:buClr>
-                <a:srgbClr val="000000"/>
-              </a:buClr>
-              <a:buSzPct val="75000"/>
-              <a:buFont typeface="Symbol" charset="2"/>
-              <a:buChar char=""/>
-            </a:pPr>
-            <a:r>
-              <a:rPr b="0" lang="en-US" sz="1200" spc="-1" strike="noStrike">
-                <a:solidFill>
-                  <a:srgbClr val="000000"/>
-                </a:solidFill>
-                <a:latin typeface="Arial"/>
-              </a:rPr>
-              <a:t>Second Outline Level</a:t>
-            </a:r>
-            <a:endParaRPr b="0" lang="en-US" sz="1200" spc="-1" strike="noStrike">
-              <a:solidFill>
-                <a:srgbClr val="000000"/>
-              </a:solidFill>
-              <a:latin typeface="Arial"/>
-            </a:endParaRPr>
-          </a:p>
-          <a:p>
-            <a:pPr lvl="2" marL="1296000" indent="-288000">
-              <a:spcBef>
-                <a:spcPts val="850"/>
-              </a:spcBef>
-              <a:buClr>
-                <a:srgbClr val="000000"/>
-              </a:buClr>
-              <a:buSzPct val="45000"/>
-              <a:buFont typeface="Wingdings" charset="2"/>
-              <a:buChar char=""/>
-            </a:pPr>
-            <a:r>
-              <a:rPr b="0" lang="en-US" sz="1200" spc="-1" strike="noStrike">
-                <a:solidFill>
-                  <a:srgbClr val="000000"/>
-                </a:solidFill>
-                <a:latin typeface="Arial"/>
-              </a:rPr>
-              <a:t>Third Outline Level</a:t>
-            </a:r>
-            <a:endParaRPr b="0" lang="en-US" sz="1200" spc="-1" strike="noStrike">
-              <a:solidFill>
-                <a:srgbClr val="000000"/>
-              </a:solidFill>
-              <a:latin typeface="Arial"/>
-            </a:endParaRPr>
-          </a:p>
-          <a:p>
-            <a:pPr lvl="3" marL="1728000" indent="-216000">
-              <a:spcBef>
-                <a:spcPts val="567"/>
-              </a:spcBef>
-              <a:buClr>
-                <a:srgbClr val="000000"/>
-              </a:buClr>
-              <a:buSzPct val="75000"/>
-              <a:buFont typeface="Symbol" charset="2"/>
-              <a:buChar char=""/>
-            </a:pPr>
-            <a:r>
-              <a:rPr b="0" lang="en-US" sz="1200" spc="-1" strike="noStrike">
-                <a:solidFill>
-                  <a:srgbClr val="000000"/>
-                </a:solidFill>
-                <a:latin typeface="Arial"/>
-              </a:rPr>
-              <a:t>Fourth Outline Level</a:t>
-            </a:r>
-            <a:endParaRPr b="0" lang="en-US" sz="1200" spc="-1" strike="noStrike">
-              <a:solidFill>
-                <a:srgbClr val="000000"/>
-              </a:solidFill>
-              <a:latin typeface="Arial"/>
-            </a:endParaRPr>
-          </a:p>
-          <a:p>
-            <a:pPr lvl="4" marL="2160000" indent="-216000">
-              <a:spcBef>
-                <a:spcPts val="283"/>
-              </a:spcBef>
-              <a:buClr>
-                <a:srgbClr val="000000"/>
-              </a:buClr>
-              <a:buSzPct val="45000"/>
-              <a:buFont typeface="Wingdings" charset="2"/>
-              <a:buChar char=""/>
-            </a:pPr>
-            <a:r>
-              <a:rPr b="0" lang="en-US" sz="1200" spc="-1" strike="noStrike">
-                <a:solidFill>
-                  <a:srgbClr val="000000"/>
-                </a:solidFill>
-                <a:latin typeface="Arial"/>
-              </a:rPr>
-              <a:t>Fifth Outline Level</a:t>
-            </a:r>
-            <a:endParaRPr b="0" lang="en-US" sz="1200" spc="-1" strike="noStrike">
-              <a:solidFill>
-                <a:srgbClr val="000000"/>
-              </a:solidFill>
-              <a:latin typeface="Arial"/>
-            </a:endParaRPr>
-          </a:p>
-          <a:p>
-            <a:pPr lvl="5" marL="2592000" indent="-216000">
-              <a:spcBef>
-                <a:spcPts val="283"/>
-              </a:spcBef>
-              <a:buClr>
-                <a:srgbClr val="000000"/>
-              </a:buClr>
-              <a:buSzPct val="45000"/>
-              <a:buFont typeface="Wingdings" charset="2"/>
-              <a:buChar char=""/>
-            </a:pPr>
-            <a:r>
-              <a:rPr b="0" lang="en-US" sz="1200" spc="-1" strike="noStrike">
-                <a:solidFill>
-                  <a:srgbClr val="000000"/>
-                </a:solidFill>
-                <a:latin typeface="Arial"/>
-              </a:rPr>
-              <a:t>Sixth Outline Level</a:t>
-            </a:r>
-            <a:endParaRPr b="0" lang="en-US" sz="1200" spc="-1" strike="noStrike">
-              <a:solidFill>
-                <a:srgbClr val="000000"/>
-              </a:solidFill>
-              <a:latin typeface="Arial"/>
-            </a:endParaRPr>
-          </a:p>
-          <a:p>
-            <a:pPr lvl="6" marL="3024000" indent="-216000">
-              <a:spcBef>
-                <a:spcPts val="283"/>
-              </a:spcBef>
-              <a:buClr>
-                <a:srgbClr val="000000"/>
-              </a:buClr>
-              <a:buSzPct val="45000"/>
-              <a:buFont typeface="Wingdings" charset="2"/>
-              <a:buChar char=""/>
-            </a:pPr>
-            <a:r>
-              <a:rPr b="0" lang="en-US" sz="1200" spc="-1" strike="noStrike">
-                <a:solidFill>
-                  <a:srgbClr val="000000"/>
-                </a:solidFill>
-                <a:latin typeface="Arial"/>
-              </a:rPr>
-              <a:t>Seventh Outline Level</a:t>
-            </a:r>
-            <a:endParaRPr b="0" lang="en-US" sz="1200" spc="-1" strike="noStrike">
-              <a:solidFill>
-                <a:srgbClr val="000000"/>
-              </a:solidFill>
-              <a:latin typeface="Arial"/>
-            </a:endParaRPr>
-          </a:p>
-        </p:txBody>
-      </p:sp>
-      <p:sp>
-        <p:nvSpPr>
-          <p:cNvPr id="28" name="PlaceHolder 3"/>
+          <p:cNvPr id="23" name="PlaceHolder 1"/>
           <p:cNvSpPr>
             <a:spLocks noGrp="1"/>
           </p:cNvSpPr>
@@ -4064,7 +2965,7 @@
         <p:spPr>
           <a:xfrm>
             <a:off x="8472600" y="4663080"/>
-            <a:ext cx="548280" cy="393120"/>
+            <a:ext cx="547920" cy="392760"/>
           </a:xfrm>
           <a:prstGeom prst="rect">
             <a:avLst/>
@@ -4076,7 +2977,7 @@
         </p:spPr>
         <p:txBody>
           <a:bodyPr lIns="91440" rIns="91440" tIns="91440" bIns="91440" anchor="ctr">
-            <a:normAutofit/>
+            <a:noAutofit/>
           </a:bodyPr>
           <a:lstStyle>
             <a:lvl1pPr indent="0" algn="r">
@@ -4106,7 +3007,7 @@
                 <a:tab algn="l" pos="0"/>
               </a:tabLst>
             </a:pPr>
-            <a:fld id="{17C9C188-8681-44ED-BEB3-C65E5C8A8A8D}" type="slidenum">
+            <a:fld id="{5A167D71-23C3-4903-BE83-3D5032DA9825}" type="slidenum">
               <a:rPr b="0" lang="en" sz="1000" spc="-1" strike="noStrike">
                 <a:solidFill>
                   <a:schemeClr val="dk2"/>
@@ -4160,18 +3061,18 @@
       </p:grpSpPr>
       <p:sp>
         <p:nvSpPr>
-          <p:cNvPr id="29" name="PlaceHolder 1"/>
+          <p:cNvPr id="24" name="PlaceHolder 1"/>
           <p:cNvSpPr>
             <a:spLocks noGrp="1"/>
           </p:cNvSpPr>
           <p:nvPr>
-            <p:ph type="title"/>
+            <p:ph type="sldNum" idx="9"/>
           </p:nvPr>
         </p:nvSpPr>
         <p:spPr>
           <a:xfrm>
-            <a:off x="490320" y="450000"/>
-            <a:ext cx="6367320" cy="4090320"/>
+            <a:off x="8472600" y="4663080"/>
+            <a:ext cx="547920" cy="392760"/>
           </a:xfrm>
           <a:prstGeom prst="rect">
             <a:avLst/>
@@ -4183,56 +3084,7 @@
         </p:spPr>
         <p:txBody>
           <a:bodyPr lIns="91440" rIns="91440" tIns="91440" bIns="91440" anchor="ctr">
-            <a:normAutofit/>
-          </a:bodyPr>
-          <a:p>
-            <a:pPr indent="0">
-              <a:buNone/>
-            </a:pPr>
-            <a:r>
-              <a:rPr b="0" lang="en-US" sz="4800" spc="-1" strike="noStrike">
-                <a:solidFill>
-                  <a:srgbClr val="000000"/>
-                </a:solidFill>
-                <a:latin typeface="Arial"/>
-              </a:rPr>
-              <a:t>Click to edit the title text format</a:t>
-            </a:r>
-            <a:endParaRPr b="0" lang="en-US" sz="4800" spc="-1" strike="noStrike">
-              <a:solidFill>
-                <a:srgbClr val="000000"/>
-              </a:solidFill>
-              <a:latin typeface="Arial"/>
-            </a:endParaRPr>
-          </a:p>
-        </p:txBody>
-      </p:sp>
-      <p:sp>
-        <p:nvSpPr>
-          <p:cNvPr id="30" name="PlaceHolder 2"/>
-          <p:cNvSpPr>
-            <a:spLocks noGrp="1"/>
-          </p:cNvSpPr>
-          <p:nvPr>
-            <p:ph type="sldNum" idx="9"/>
-          </p:nvPr>
-        </p:nvSpPr>
-        <p:spPr>
-          <a:xfrm>
-            <a:off x="8472600" y="4663080"/>
-            <a:ext cx="548280" cy="393120"/>
-          </a:xfrm>
-          <a:prstGeom prst="rect">
-            <a:avLst/>
-          </a:prstGeom>
-          <a:noFill/>
-          <a:ln w="0">
-            <a:noFill/>
-          </a:ln>
-        </p:spPr>
-        <p:txBody>
-          <a:bodyPr lIns="91440" rIns="91440" tIns="91440" bIns="91440" anchor="ctr">
-            <a:normAutofit/>
+            <a:noAutofit/>
           </a:bodyPr>
           <a:lstStyle>
             <a:lvl1pPr indent="0" algn="r">
@@ -4262,7 +3114,7 @@
                 <a:tab algn="l" pos="0"/>
               </a:tabLst>
             </a:pPr>
-            <a:fld id="{9ACC1D6F-D99F-4850-A1A1-64F5AC772277}" type="slidenum">
+            <a:fld id="{3DE0DF1A-79BB-40E0-B83B-06B776F921CD}" type="slidenum">
               <a:rPr b="0" lang="en" sz="1000" spc="-1" strike="noStrike">
                 <a:solidFill>
                   <a:schemeClr val="dk2"/>
@@ -4309,7 +3161,7 @@
       </p:grpSpPr>
       <p:sp>
         <p:nvSpPr>
-          <p:cNvPr id="37" name="PlaceHolder 1"/>
+          <p:cNvPr id="28" name="PlaceHolder 1"/>
           <p:cNvSpPr>
             <a:spLocks noGrp="1"/>
           </p:cNvSpPr>
@@ -4320,7 +3172,7 @@
         <p:spPr>
           <a:xfrm>
             <a:off x="311760" y="744480"/>
-            <a:ext cx="8520120" cy="2052360"/>
+            <a:ext cx="8519760" cy="2052000"/>
           </a:xfrm>
           <a:prstGeom prst="rect">
             <a:avLst/>
@@ -4365,7 +3217,7 @@
       </p:sp>
       <p:sp>
         <p:nvSpPr>
-          <p:cNvPr id="38" name="PlaceHolder 2"/>
+          <p:cNvPr id="29" name="PlaceHolder 2"/>
           <p:cNvSpPr>
             <a:spLocks noGrp="1"/>
           </p:cNvSpPr>
@@ -4376,7 +3228,7 @@
         <p:spPr>
           <a:xfrm>
             <a:off x="311760" y="2834280"/>
-            <a:ext cx="8520120" cy="792360"/>
+            <a:ext cx="8519760" cy="792000"/>
           </a:xfrm>
           <a:prstGeom prst="rect">
             <a:avLst/>
@@ -4411,10 +3263,9 @@
             </a:r>
             <a:endParaRPr b="0" lang="en-US" sz="2800" spc="-1" strike="noStrike">
               <a:solidFill>
-                <a:schemeClr val="dk2"/>
-              </a:solidFill>
-              <a:latin typeface="Arial"/>
-              <a:ea typeface="Arial"/>
+                <a:srgbClr val="000000"/>
+              </a:solidFill>
+              <a:latin typeface="Arial"/>
             </a:endParaRPr>
           </a:p>
         </p:txBody>
@@ -4451,7 +3302,7 @@
       </p:grpSpPr>
       <p:sp>
         <p:nvSpPr>
-          <p:cNvPr id="39" name="PlaceHolder 1"/>
+          <p:cNvPr id="30" name="PlaceHolder 1"/>
           <p:cNvSpPr>
             <a:spLocks noGrp="1"/>
           </p:cNvSpPr>
@@ -4462,7 +3313,7 @@
         <p:spPr>
           <a:xfrm>
             <a:off x="311760" y="444960"/>
-            <a:ext cx="8520120" cy="572400"/>
+            <a:ext cx="8519760" cy="572040"/>
           </a:xfrm>
           <a:prstGeom prst="rect">
             <a:avLst/>
@@ -4474,7 +3325,7 @@
         </p:spPr>
         <p:txBody>
           <a:bodyPr lIns="91440" rIns="91440" tIns="91440" bIns="91440" anchor="t">
-            <a:normAutofit fontScale="93550"/>
+            <a:normAutofit fontScale="93333"/>
           </a:bodyPr>
           <a:p>
             <a:pPr indent="0">
@@ -4507,7 +3358,7 @@
       </p:sp>
       <p:sp>
         <p:nvSpPr>
-          <p:cNvPr id="40" name="PlaceHolder 2"/>
+          <p:cNvPr id="31" name="PlaceHolder 2"/>
           <p:cNvSpPr>
             <a:spLocks noGrp="1"/>
           </p:cNvSpPr>
@@ -4518,7 +3369,7 @@
         <p:spPr>
           <a:xfrm>
             <a:off x="311760" y="1152360"/>
-            <a:ext cx="8520120" cy="3416040"/>
+            <a:ext cx="8519760" cy="3415680"/>
           </a:xfrm>
           <a:prstGeom prst="rect">
             <a:avLst/>
@@ -4790,7 +3641,7 @@
       </p:grpSpPr>
       <p:sp>
         <p:nvSpPr>
-          <p:cNvPr id="41" name="PlaceHolder 1"/>
+          <p:cNvPr id="32" name="PlaceHolder 1"/>
           <p:cNvSpPr>
             <a:spLocks noGrp="1"/>
           </p:cNvSpPr>
@@ -4801,7 +3652,7 @@
         <p:spPr>
           <a:xfrm>
             <a:off x="311760" y="444960"/>
-            <a:ext cx="8520120" cy="572400"/>
+            <a:ext cx="8519760" cy="572040"/>
           </a:xfrm>
           <a:prstGeom prst="rect">
             <a:avLst/>
@@ -4813,7 +3664,7 @@
         </p:spPr>
         <p:txBody>
           <a:bodyPr lIns="91440" rIns="91440" tIns="91440" bIns="91440" anchor="t">
-            <a:normAutofit fontScale="93550"/>
+            <a:normAutofit fontScale="93333"/>
           </a:bodyPr>
           <a:p>
             <a:pPr indent="0">
@@ -4846,7 +3697,7 @@
       </p:sp>
       <p:sp>
         <p:nvSpPr>
-          <p:cNvPr id="42" name="PlaceHolder 2"/>
+          <p:cNvPr id="33" name="PlaceHolder 2"/>
           <p:cNvSpPr>
             <a:spLocks noGrp="1"/>
           </p:cNvSpPr>
@@ -4857,7 +3708,7 @@
         <p:spPr>
           <a:xfrm>
             <a:off x="311760" y="1152360"/>
-            <a:ext cx="8520120" cy="3416040"/>
+            <a:ext cx="8519760" cy="3415680"/>
           </a:xfrm>
           <a:prstGeom prst="rect">
             <a:avLst/>
@@ -5185,7 +4036,7 @@
       </p:grpSpPr>
       <p:sp>
         <p:nvSpPr>
-          <p:cNvPr id="43" name="PlaceHolder 1"/>
+          <p:cNvPr id="34" name="PlaceHolder 1"/>
           <p:cNvSpPr>
             <a:spLocks noGrp="1"/>
           </p:cNvSpPr>
@@ -5196,7 +4047,7 @@
         <p:spPr>
           <a:xfrm>
             <a:off x="311760" y="444960"/>
-            <a:ext cx="8520120" cy="572400"/>
+            <a:ext cx="8519760" cy="572040"/>
           </a:xfrm>
           <a:prstGeom prst="rect">
             <a:avLst/>
@@ -5208,7 +4059,7 @@
         </p:spPr>
         <p:txBody>
           <a:bodyPr lIns="91440" rIns="91440" tIns="91440" bIns="91440" anchor="t">
-            <a:normAutofit fontScale="93550"/>
+            <a:normAutofit fontScale="93333"/>
           </a:bodyPr>
           <a:p>
             <a:pPr indent="0">
@@ -5241,7 +4092,7 @@
       </p:sp>
       <p:sp>
         <p:nvSpPr>
-          <p:cNvPr id="44" name="PlaceHolder 2"/>
+          <p:cNvPr id="35" name="PlaceHolder 2"/>
           <p:cNvSpPr>
             <a:spLocks noGrp="1"/>
           </p:cNvSpPr>
@@ -5252,7 +4103,7 @@
         <p:spPr>
           <a:xfrm>
             <a:off x="311760" y="1152360"/>
-            <a:ext cx="8520120" cy="3416040"/>
+            <a:ext cx="8519760" cy="3415680"/>
           </a:xfrm>
           <a:prstGeom prst="rect">
             <a:avLst/>
@@ -5524,7 +4375,7 @@
       </p:grpSpPr>
       <p:sp>
         <p:nvSpPr>
-          <p:cNvPr id="45" name="PlaceHolder 1"/>
+          <p:cNvPr id="36" name="PlaceHolder 1"/>
           <p:cNvSpPr>
             <a:spLocks noGrp="1"/>
           </p:cNvSpPr>
@@ -5535,7 +4386,7 @@
         <p:spPr>
           <a:xfrm>
             <a:off x="311760" y="444960"/>
-            <a:ext cx="8520120" cy="572400"/>
+            <a:ext cx="8519760" cy="572040"/>
           </a:xfrm>
           <a:prstGeom prst="rect">
             <a:avLst/>
@@ -5547,7 +4398,7 @@
         </p:spPr>
         <p:txBody>
           <a:bodyPr lIns="91440" rIns="91440" tIns="91440" bIns="91440" anchor="t">
-            <a:normAutofit fontScale="93550"/>
+            <a:normAutofit fontScale="93333"/>
           </a:bodyPr>
           <a:p>
             <a:pPr indent="0">
@@ -5580,7 +4431,7 @@
       </p:sp>
       <p:sp>
         <p:nvSpPr>
-          <p:cNvPr id="46" name="PlaceHolder 2"/>
+          <p:cNvPr id="37" name="PlaceHolder 2"/>
           <p:cNvSpPr>
             <a:spLocks noGrp="1"/>
           </p:cNvSpPr>
@@ -5591,7 +4442,7 @@
         <p:spPr>
           <a:xfrm>
             <a:off x="311760" y="1152360"/>
-            <a:ext cx="8520120" cy="3416040"/>
+            <a:ext cx="8519760" cy="3415680"/>
           </a:xfrm>
           <a:prstGeom prst="rect">
             <a:avLst/>
@@ -5807,7 +4658,7 @@
       </p:grpSpPr>
       <p:sp>
         <p:nvSpPr>
-          <p:cNvPr id="47" name="PlaceHolder 1"/>
+          <p:cNvPr id="38" name="PlaceHolder 1"/>
           <p:cNvSpPr>
             <a:spLocks noGrp="1"/>
           </p:cNvSpPr>
@@ -5818,7 +4669,7 @@
         <p:spPr>
           <a:xfrm>
             <a:off x="311760" y="444960"/>
-            <a:ext cx="8520120" cy="572400"/>
+            <a:ext cx="8519760" cy="572040"/>
           </a:xfrm>
           <a:prstGeom prst="rect">
             <a:avLst/>
@@ -5830,7 +4681,7 @@
         </p:spPr>
         <p:txBody>
           <a:bodyPr lIns="91440" rIns="91440" tIns="91440" bIns="91440" anchor="t">
-            <a:normAutofit fontScale="93550"/>
+            <a:normAutofit fontScale="93333"/>
           </a:bodyPr>
           <a:p>
             <a:pPr indent="0">
@@ -5863,7 +4714,7 @@
       </p:sp>
       <p:sp>
         <p:nvSpPr>
-          <p:cNvPr id="48" name="PlaceHolder 2"/>
+          <p:cNvPr id="39" name="PlaceHolder 2"/>
           <p:cNvSpPr>
             <a:spLocks noGrp="1"/>
           </p:cNvSpPr>
@@ -5874,7 +4725,7 @@
         <p:spPr>
           <a:xfrm>
             <a:off x="311760" y="1152360"/>
-            <a:ext cx="8520120" cy="3416040"/>
+            <a:ext cx="8519760" cy="3415680"/>
           </a:xfrm>
           <a:prstGeom prst="rect">
             <a:avLst/>
@@ -6062,7 +4913,7 @@
       </p:grpSpPr>
       <p:sp>
         <p:nvSpPr>
-          <p:cNvPr id="49" name="PlaceHolder 1"/>
+          <p:cNvPr id="40" name="PlaceHolder 1"/>
           <p:cNvSpPr>
             <a:spLocks noGrp="1"/>
           </p:cNvSpPr>
@@ -6073,7 +4924,7 @@
         <p:spPr>
           <a:xfrm>
             <a:off x="311760" y="444960"/>
-            <a:ext cx="8520120" cy="572400"/>
+            <a:ext cx="8519760" cy="572040"/>
           </a:xfrm>
           <a:prstGeom prst="rect">
             <a:avLst/>
@@ -6085,7 +4936,7 @@
         </p:spPr>
         <p:txBody>
           <a:bodyPr lIns="91440" rIns="91440" tIns="91440" bIns="91440" anchor="t">
-            <a:normAutofit fontScale="93550"/>
+            <a:normAutofit fontScale="93333"/>
           </a:bodyPr>
           <a:p>
             <a:pPr indent="0">
@@ -6118,7 +4969,7 @@
       </p:sp>
       <p:sp>
         <p:nvSpPr>
-          <p:cNvPr id="50" name="PlaceHolder 2"/>
+          <p:cNvPr id="41" name="PlaceHolder 2"/>
           <p:cNvSpPr>
             <a:spLocks noGrp="1"/>
           </p:cNvSpPr>
@@ -6129,7 +4980,7 @@
         <p:spPr>
           <a:xfrm>
             <a:off x="311760" y="1152360"/>
-            <a:ext cx="8520120" cy="3416040"/>
+            <a:ext cx="8519760" cy="3415680"/>
           </a:xfrm>
           <a:prstGeom prst="rect">
             <a:avLst/>
@@ -6333,6 +5184,119 @@
               <a:t>While not a 1:1 translation in all circumstances, having a good foundation of data structures in C will help you in many places in Software Engineering</a:t>
             </a:r>
             <a:endParaRPr b="0" lang="en-US" sz="1800" spc="-1" strike="noStrike">
+              <a:solidFill>
+                <a:srgbClr val="000000"/>
+              </a:solidFill>
+              <a:latin typeface="Arial"/>
+            </a:endParaRPr>
+          </a:p>
+        </p:txBody>
+      </p:sp>
+    </p:spTree>
+  </p:cSld>
+  <mc:AlternateContent>
+    <mc:Choice Requires="p14">
+      <p:transition spd="slow" p14:dur="2000"/>
+    </mc:Choice>
+    <mc:Fallback>
+      <p:transition spd="slow"/>
+    </mc:Fallback>
+  </mc:AlternateContent>
+</p:sld>
+</file>
+
+<file path=ppt/slides/slide8.xml><?xml version="1.0" encoding="utf-8"?>
+<p:sld xmlns:a="http://schemas.openxmlformats.org/drawingml/2006/main" xmlns:p="http://schemas.openxmlformats.org/presentationml/2006/main" xmlns:r="http://schemas.openxmlformats.org/officeDocument/2006/relationships" xmlns:p14="http://schemas.microsoft.com/office/powerpoint/2010/main" xmlns:p15="http://schemas.microsoft.com/office/powerpoint/2012/main" xmlns:mc="http://schemas.openxmlformats.org/markup-compatibility/2006">
+  <p:cSld>
+    <p:spTree>
+      <p:nvGrpSpPr>
+        <p:cNvPr id="1" name=""/>
+        <p:cNvGrpSpPr/>
+        <p:nvPr/>
+      </p:nvGrpSpPr>
+      <p:grpSpPr>
+        <a:xfrm>
+          <a:off x="0" y="0"/>
+          <a:ext cx="0" cy="0"/>
+          <a:chOff x="0" y="0"/>
+          <a:chExt cx="0" cy="0"/>
+        </a:xfrm>
+      </p:grpSpPr>
+      <p:sp>
+        <p:nvSpPr>
+          <p:cNvPr id="42" name="PlaceHolder 1"/>
+          <p:cNvSpPr>
+            <a:spLocks noGrp="1"/>
+          </p:cNvSpPr>
+          <p:nvPr>
+            <p:ph type="title"/>
+          </p:nvPr>
+        </p:nvSpPr>
+        <p:spPr>
+          <a:xfrm>
+            <a:off x="311760" y="418320"/>
+            <a:ext cx="8519760" cy="625320"/>
+          </a:xfrm>
+          <a:prstGeom prst="rect">
+            <a:avLst/>
+          </a:prstGeom>
+          <a:noFill/>
+          <a:ln w="0">
+            <a:noFill/>
+          </a:ln>
+        </p:spPr>
+        <p:txBody>
+          <a:bodyPr lIns="0" rIns="0" tIns="0" bIns="0" anchor="ctr">
+            <a:noAutofit/>
+          </a:bodyPr>
+          <a:p>
+            <a:pPr indent="0" algn="ctr">
+              <a:buNone/>
+            </a:pPr>
+            <a:endParaRPr b="0" lang="en-US" sz="4400" spc="-1" strike="noStrike">
+              <a:solidFill>
+                <a:srgbClr val="000000"/>
+              </a:solidFill>
+              <a:latin typeface="Arial"/>
+            </a:endParaRPr>
+          </a:p>
+        </p:txBody>
+      </p:sp>
+      <p:sp>
+        <p:nvSpPr>
+          <p:cNvPr id="43" name="PlaceHolder 2"/>
+          <p:cNvSpPr>
+            <a:spLocks noGrp="1"/>
+          </p:cNvSpPr>
+          <p:nvPr>
+            <p:ph/>
+          </p:nvPr>
+        </p:nvSpPr>
+        <p:spPr>
+          <a:xfrm>
+            <a:off x="311760" y="1152360"/>
+            <a:ext cx="8519760" cy="3415680"/>
+          </a:xfrm>
+          <a:prstGeom prst="rect">
+            <a:avLst/>
+          </a:prstGeom>
+          <a:noFill/>
+          <a:ln w="0">
+            <a:noFill/>
+          </a:ln>
+        </p:spPr>
+        <p:txBody>
+          <a:bodyPr lIns="0" rIns="0" tIns="0" bIns="0" anchor="t">
+            <a:normAutofit/>
+          </a:bodyPr>
+          <a:p>
+            <a:pPr indent="0">
+              <a:spcBef>
+                <a:spcPts val="1417"/>
+              </a:spcBef>
+              <a:buNone/>
+            </a:pPr>
+            <a:endParaRPr b="0" lang="en-US" sz="3200" spc="-1" strike="noStrike">
               <a:solidFill>
                 <a:srgbClr val="000000"/>
               </a:solidFill>

</xml_diff>